<commit_message>
fix(template): update slide font
</commit_message>
<xml_diff>
--- a/api/template/passage_template.pptx
+++ b/api/template/passage_template.pptx
@@ -291,7 +291,7 @@
                 <a:cs typeface="+mn-cs"/>
               </a:rPr>
               <a:pPr algn="l" rtl="0"/>
-              <a:t>5/29/2024</a:t>
+              <a:t>6/16/2024</a:t>
             </a:fld>
             <a:endParaRPr lang="en-US" sz="1200" kern="1200">
               <a:solidFill>
@@ -538,7 +538,7 @@
                 <a:cs typeface="+mn-cs"/>
               </a:rPr>
               <a:pPr algn="l" rtl="0"/>
-              <a:t>5/29/2024</a:t>
+              <a:t>6/16/2024</a:t>
             </a:fld>
             <a:endParaRPr lang="en-US" sz="1200" kern="1200">
               <a:solidFill>
@@ -766,7 +766,7 @@
                 <a:cs typeface="+mn-cs"/>
               </a:rPr>
               <a:pPr algn="l" rtl="0"/>
-              <a:t>5/29/2024</a:t>
+              <a:t>6/16/2024</a:t>
             </a:fld>
             <a:endParaRPr lang="en-US" sz="1200" kern="1200">
               <a:solidFill>
@@ -984,7 +984,7 @@
                 <a:cs typeface="+mn-cs"/>
               </a:rPr>
               <a:pPr algn="l" rtl="0"/>
-              <a:t>5/29/2024</a:t>
+              <a:t>6/16/2024</a:t>
             </a:fld>
             <a:endParaRPr lang="en-US" sz="1200" kern="1200">
               <a:solidFill>
@@ -1279,7 +1279,7 @@
                 <a:cs typeface="+mn-cs"/>
               </a:rPr>
               <a:pPr algn="l" rtl="0"/>
-              <a:t>5/29/2024</a:t>
+              <a:t>6/16/2024</a:t>
             </a:fld>
             <a:endParaRPr lang="en-US" sz="1200" kern="1200">
               <a:solidFill>
@@ -1614,7 +1614,7 @@
                 <a:cs typeface="+mn-cs"/>
               </a:rPr>
               <a:pPr algn="l" rtl="0"/>
-              <a:t>5/29/2024</a:t>
+              <a:t>6/16/2024</a:t>
             </a:fld>
             <a:endParaRPr lang="en-US" sz="1200" kern="1200">
               <a:solidFill>
@@ -2083,7 +2083,7 @@
                 <a:cs typeface="+mn-cs"/>
               </a:rPr>
               <a:pPr algn="l" rtl="0"/>
-              <a:t>5/29/2024</a:t>
+              <a:t>6/16/2024</a:t>
             </a:fld>
             <a:endParaRPr lang="en-US" sz="1200" kern="1200">
               <a:solidFill>
@@ -2250,7 +2250,7 @@
                 <a:cs typeface="+mn-cs"/>
               </a:rPr>
               <a:pPr algn="l" rtl="0"/>
-              <a:t>5/29/2024</a:t>
+              <a:t>6/16/2024</a:t>
             </a:fld>
             <a:endParaRPr lang="en-US" sz="1200" kern="1200">
               <a:solidFill>
@@ -2395,7 +2395,7 @@
                 <a:cs typeface="+mn-cs"/>
               </a:rPr>
               <a:pPr algn="l" rtl="0"/>
-              <a:t>5/29/2024</a:t>
+              <a:t>6/16/2024</a:t>
             </a:fld>
             <a:endParaRPr lang="en-US" sz="1200" kern="1200">
               <a:solidFill>
@@ -2720,7 +2720,7 @@
                 <a:cs typeface="+mn-cs"/>
               </a:rPr>
               <a:pPr algn="l" rtl="0"/>
-              <a:t>5/29/2024</a:t>
+              <a:t>6/16/2024</a:t>
             </a:fld>
             <a:endParaRPr lang="en-US" sz="1200" kern="1200">
               <a:solidFill>
@@ -3022,7 +3022,7 @@
                 <a:cs typeface="+mn-cs"/>
               </a:rPr>
               <a:pPr algn="l" rtl="0"/>
-              <a:t>5/29/2024</a:t>
+              <a:t>6/16/2024</a:t>
             </a:fld>
             <a:endParaRPr lang="en-US" sz="1200" kern="1200">
               <a:solidFill>
@@ -3283,7 +3283,7 @@
                 <a:cs typeface="+mn-cs"/>
               </a:rPr>
               <a:pPr rtl="0"/>
-              <a:t>5/29/2024</a:t>
+              <a:t>6/16/2024</a:t>
             </a:fld>
             <a:endParaRPr lang="en-US" kern="1200">
               <a:solidFill>
@@ -3839,8 +3839,8 @@
                     </a:srgbClr>
                   </a:outerShdw>
                 </a:effectLst>
-                <a:latin typeface="FZCuYuan-M03S" pitchFamily="65" charset="-122"/>
-                <a:ea typeface="FZCuYuan-M03S" pitchFamily="65" charset="-122"/>
+                <a:latin typeface="KaiTi" panose="02010609060101010101" pitchFamily="49" charset="-122"/>
+                <a:ea typeface="KaiTi" panose="02010609060101010101" pitchFamily="49" charset="-122"/>
               </a:rPr>
               <a:t>@chi_book@</a:t>
             </a:r>
@@ -3868,9 +3868,8 @@
               </a:effectLst>
               <a:uLnTx/>
               <a:uFillTx/>
-              <a:latin typeface="FZCuYuan-M03S" pitchFamily="65" charset="-122"/>
-              <a:ea typeface="FZCuYuan-M03S" pitchFamily="65" charset="-122"/>
-              <a:cs typeface="+mn-cs"/>
+              <a:latin typeface="KaiTi" panose="02010609060101010101" pitchFamily="49" charset="-122"/>
+              <a:ea typeface="KaiTi" panose="02010609060101010101" pitchFamily="49" charset="-122"/>
             </a:endParaRPr>
           </a:p>
           <a:p>
@@ -3914,8 +3913,8 @@
                     </a:srgbClr>
                   </a:outerShdw>
                 </a:effectLst>
-                <a:latin typeface="FZCuYuan-M03S" pitchFamily="65" charset="-122"/>
-                <a:ea typeface="FZCuYuan-M03S" pitchFamily="65" charset="-122"/>
+                <a:latin typeface="KaiTi" panose="02010609060101010101" pitchFamily="49" charset="-122"/>
+                <a:ea typeface="KaiTi" panose="02010609060101010101" pitchFamily="49" charset="-122"/>
               </a:rPr>
               <a:t>@eng_book@</a:t>
             </a:r>
@@ -3943,9 +3942,8 @@
               </a:effectLst>
               <a:uLnTx/>
               <a:uFillTx/>
-              <a:latin typeface="FZCuYuan-M03S" pitchFamily="65" charset="-122"/>
-              <a:ea typeface="FZCuYuan-M03S" pitchFamily="65" charset="-122"/>
-              <a:cs typeface="+mn-cs"/>
+              <a:latin typeface="KaiTi" panose="02010609060101010101" pitchFamily="49" charset="-122"/>
+              <a:ea typeface="KaiTi" panose="02010609060101010101" pitchFamily="49" charset="-122"/>
             </a:endParaRPr>
           </a:p>
           <a:p>
@@ -3989,8 +3987,8 @@
                     </a:srgbClr>
                   </a:outerShdw>
                 </a:effectLst>
-                <a:latin typeface="FZCuYuan-M03S" pitchFamily="65" charset="-122"/>
-                <a:ea typeface="FZCuYuan-M03S" pitchFamily="65" charset="-122"/>
+                <a:latin typeface="KaiTi" panose="02010609060101010101" pitchFamily="49" charset="-122"/>
+                <a:ea typeface="KaiTi" panose="02010609060101010101" pitchFamily="49" charset="-122"/>
               </a:rPr>
               <a:t>@verse@</a:t>
             </a:r>
@@ -4018,9 +4016,8 @@
               </a:effectLst>
               <a:uLnTx/>
               <a:uFillTx/>
-              <a:latin typeface="FZCuYuan-M03S" pitchFamily="65" charset="-122"/>
-              <a:ea typeface="FZCuYuan-M03S" pitchFamily="65" charset="-122"/>
-              <a:cs typeface="+mn-cs"/>
+              <a:latin typeface="KaiTi" panose="02010609060101010101" pitchFamily="49" charset="-122"/>
+              <a:ea typeface="KaiTi" panose="02010609060101010101" pitchFamily="49" charset="-122"/>
             </a:endParaRPr>
           </a:p>
         </p:txBody>

</xml_diff>

<commit_message>
fix(template): remove unused slides
</commit_message>
<xml_diff>
--- a/api/template/passage_template.pptx
+++ b/api/template/passage_template.pptx
@@ -7,10 +7,6 @@
   <p:sldIdLst>
     <p:sldId id="13552" r:id="rId2"/>
     <p:sldId id="13553" r:id="rId3"/>
-    <p:sldId id="13557" r:id="rId4"/>
-    <p:sldId id="13554" r:id="rId5"/>
-    <p:sldId id="13555" r:id="rId6"/>
-    <p:sldId id="13556" r:id="rId7"/>
   </p:sldIdLst>
   <p:sldSz cx="12192000" cy="6858000"/>
   <p:notesSz cx="6858000" cy="9144000"/>
@@ -291,7 +287,7 @@
                 <a:cs typeface="+mn-cs"/>
               </a:rPr>
               <a:pPr algn="l" rtl="0"/>
-              <a:t>6/16/2024</a:t>
+              <a:t>7/1/2024</a:t>
             </a:fld>
             <a:endParaRPr lang="en-US" sz="1200" kern="1200">
               <a:solidFill>
@@ -538,7 +534,7 @@
                 <a:cs typeface="+mn-cs"/>
               </a:rPr>
               <a:pPr algn="l" rtl="0"/>
-              <a:t>6/16/2024</a:t>
+              <a:t>7/1/2024</a:t>
             </a:fld>
             <a:endParaRPr lang="en-US" sz="1200" kern="1200">
               <a:solidFill>
@@ -766,7 +762,7 @@
                 <a:cs typeface="+mn-cs"/>
               </a:rPr>
               <a:pPr algn="l" rtl="0"/>
-              <a:t>6/16/2024</a:t>
+              <a:t>7/1/2024</a:t>
             </a:fld>
             <a:endParaRPr lang="en-US" sz="1200" kern="1200">
               <a:solidFill>
@@ -984,7 +980,7 @@
                 <a:cs typeface="+mn-cs"/>
               </a:rPr>
               <a:pPr algn="l" rtl="0"/>
-              <a:t>6/16/2024</a:t>
+              <a:t>7/1/2024</a:t>
             </a:fld>
             <a:endParaRPr lang="en-US" sz="1200" kern="1200">
               <a:solidFill>
@@ -1279,7 +1275,7 @@
                 <a:cs typeface="+mn-cs"/>
               </a:rPr>
               <a:pPr algn="l" rtl="0"/>
-              <a:t>6/16/2024</a:t>
+              <a:t>7/1/2024</a:t>
             </a:fld>
             <a:endParaRPr lang="en-US" sz="1200" kern="1200">
               <a:solidFill>
@@ -1614,7 +1610,7 @@
                 <a:cs typeface="+mn-cs"/>
               </a:rPr>
               <a:pPr algn="l" rtl="0"/>
-              <a:t>6/16/2024</a:t>
+              <a:t>7/1/2024</a:t>
             </a:fld>
             <a:endParaRPr lang="en-US" sz="1200" kern="1200">
               <a:solidFill>
@@ -2083,7 +2079,7 @@
                 <a:cs typeface="+mn-cs"/>
               </a:rPr>
               <a:pPr algn="l" rtl="0"/>
-              <a:t>6/16/2024</a:t>
+              <a:t>7/1/2024</a:t>
             </a:fld>
             <a:endParaRPr lang="en-US" sz="1200" kern="1200">
               <a:solidFill>
@@ -2250,7 +2246,7 @@
                 <a:cs typeface="+mn-cs"/>
               </a:rPr>
               <a:pPr algn="l" rtl="0"/>
-              <a:t>6/16/2024</a:t>
+              <a:t>7/1/2024</a:t>
             </a:fld>
             <a:endParaRPr lang="en-US" sz="1200" kern="1200">
               <a:solidFill>
@@ -2395,7 +2391,7 @@
                 <a:cs typeface="+mn-cs"/>
               </a:rPr>
               <a:pPr algn="l" rtl="0"/>
-              <a:t>6/16/2024</a:t>
+              <a:t>7/1/2024</a:t>
             </a:fld>
             <a:endParaRPr lang="en-US" sz="1200" kern="1200">
               <a:solidFill>
@@ -2720,7 +2716,7 @@
                 <a:cs typeface="+mn-cs"/>
               </a:rPr>
               <a:pPr algn="l" rtl="0"/>
-              <a:t>6/16/2024</a:t>
+              <a:t>7/1/2024</a:t>
             </a:fld>
             <a:endParaRPr lang="en-US" sz="1200" kern="1200">
               <a:solidFill>
@@ -3022,7 +3018,7 @@
                 <a:cs typeface="+mn-cs"/>
               </a:rPr>
               <a:pPr algn="l" rtl="0"/>
-              <a:t>6/16/2024</a:t>
+              <a:t>7/1/2024</a:t>
             </a:fld>
             <a:endParaRPr lang="en-US" sz="1200" kern="1200">
               <a:solidFill>
@@ -3283,7 +3279,7 @@
                 <a:cs typeface="+mn-cs"/>
               </a:rPr>
               <a:pPr rtl="0"/>
-              <a:t>6/16/2024</a:t>
+              <a:t>7/1/2024</a:t>
             </a:fld>
             <a:endParaRPr lang="en-US" kern="1200">
               <a:solidFill>
@@ -4322,806 +4318,6 @@
 </p:sld>
 </file>
 
-<file path=ppt/slides/slide3.xml><?xml version="1.0" encoding="utf-8"?>
-<p:sld xmlns:a="http://schemas.openxmlformats.org/drawingml/2006/main" xmlns:r="http://schemas.openxmlformats.org/officeDocument/2006/relationships" xmlns:p="http://schemas.openxmlformats.org/presentationml/2006/main">
-  <p:cSld>
-    <p:bg>
-      <p:bgPr>
-        <a:solidFill>
-          <a:srgbClr val="000000"/>
-        </a:solidFill>
-        <a:effectLst/>
-      </p:bgPr>
-    </p:bg>
-    <p:spTree>
-      <p:nvGrpSpPr>
-        <p:cNvPr id="1" name="">
-          <a:extLst>
-            <a:ext uri="{FF2B5EF4-FFF2-40B4-BE49-F238E27FC236}">
-              <a16:creationId xmlns:a16="http://schemas.microsoft.com/office/drawing/2014/main" id="{1525D83F-E4A7-779F-9880-E6738E478048}"/>
-            </a:ext>
-          </a:extLst>
-        </p:cNvPr>
-        <p:cNvGrpSpPr/>
-        <p:nvPr/>
-      </p:nvGrpSpPr>
-      <p:grpSpPr>
-        <a:xfrm>
-          <a:off x="0" y="0"/>
-          <a:ext cx="0" cy="0"/>
-          <a:chOff x="0" y="0"/>
-          <a:chExt cx="0" cy="0"/>
-        </a:xfrm>
-      </p:grpSpPr>
-      <p:sp>
-        <p:nvSpPr>
-          <p:cNvPr id="4" name="passage">
-            <a:extLst>
-              <a:ext uri="{FF2B5EF4-FFF2-40B4-BE49-F238E27FC236}">
-                <a16:creationId xmlns:a16="http://schemas.microsoft.com/office/drawing/2014/main" id="{6FE7A79B-6878-22D3-70AC-C2274F3C435A}"/>
-              </a:ext>
-            </a:extLst>
-          </p:cNvPr>
-          <p:cNvSpPr txBox="1">
-            <a:spLocks noGrp="1" noRot="1" noMove="1" noResize="1" noEditPoints="1" noAdjustHandles="1" noChangeArrowheads="1" noChangeShapeType="1"/>
-          </p:cNvSpPr>
-          <p:nvPr/>
-        </p:nvSpPr>
-        <p:spPr>
-          <a:xfrm>
-            <a:off x="858416" y="1228404"/>
-            <a:ext cx="10590245" cy="3908748"/>
-          </a:xfrm>
-          <a:prstGeom prst="rect">
-            <a:avLst/>
-          </a:prstGeom>
-          <a:noFill/>
-        </p:spPr>
-        <p:txBody>
-          <a:bodyPr wrap="square" lIns="91425" tIns="45713" rIns="91425" bIns="45713">
-            <a:spAutoFit/>
-          </a:bodyPr>
-          <a:lstStyle/>
-          <a:p>
-            <a:pPr marL="0" marR="0" lvl="0" indent="0" algn="ctr" defTabSz="914353" rtl="0" eaLnBrk="1" fontAlgn="auto" latinLnBrk="0" hangingPunct="1">
-              <a:lnSpc>
-                <a:spcPct val="100000"/>
-              </a:lnSpc>
-              <a:spcBef>
-                <a:spcPts val="0"/>
-              </a:spcBef>
-              <a:spcAft>
-                <a:spcPts val="0"/>
-              </a:spcAft>
-              <a:buClrTx/>
-              <a:buSzTx/>
-              <a:buFontTx/>
-              <a:buNone/>
-              <a:tabLst/>
-              <a:defRPr/>
-            </a:pPr>
-            <a:r>
-              <a:rPr kumimoji="0" lang="en-US" altLang="zh-CN" sz="4000" b="1" i="0" u="none" strike="noStrike" kern="1200" cap="none" spc="0" normalizeH="0" baseline="30000" noProof="0" dirty="0">
-                <a:ln>
-                  <a:noFill/>
-                </a:ln>
-                <a:solidFill>
-                  <a:srgbClr val="FFFF00"/>
-                </a:solidFill>
-                <a:effectLst>
-                  <a:outerShdw blurRad="38100" dist="38100" dir="2700000" algn="tl">
-                    <a:srgbClr val="000000">
-                      <a:alpha val="43137"/>
-                    </a:srgbClr>
-                  </a:outerShdw>
-                </a:effectLst>
-                <a:uLnTx/>
-                <a:uFillTx/>
-                <a:latin typeface="KaiTi" pitchFamily="49" charset="-122"/>
-                <a:ea typeface="KaiTi" pitchFamily="49" charset="-122"/>
-                <a:cs typeface="+mn-cs"/>
-              </a:rPr>
-              <a:t>9 </a:t>
-            </a:r>
-            <a:r>
-              <a:rPr kumimoji="0" lang="zh-CN" altLang="en-US" sz="4400" b="1" i="0" u="none" strike="noStrike" kern="1200" cap="none" spc="0" normalizeH="0" baseline="0" noProof="0" dirty="0">
-                <a:ln>
-                  <a:noFill/>
-                </a:ln>
-                <a:solidFill>
-                  <a:srgbClr val="FFFFFF"/>
-                </a:solidFill>
-                <a:effectLst>
-                  <a:outerShdw blurRad="38100" dist="38100" dir="2700000" algn="tl">
-                    <a:srgbClr val="000000">
-                      <a:alpha val="43137"/>
-                    </a:srgbClr>
-                  </a:outerShdw>
-                </a:effectLst>
-                <a:uLnTx/>
-                <a:uFillTx/>
-                <a:latin typeface="KaiTi" pitchFamily="49" charset="-122"/>
-                <a:ea typeface="KaiTi" pitchFamily="49" charset="-122"/>
-                <a:cs typeface="+mn-cs"/>
-              </a:rPr>
-              <a:t>耶稣从那里往前走，看见一个人，名叫马太，坐在税关上，就对他说：“你跟从我来！”他就起来跟从了耶稣。</a:t>
-            </a:r>
-            <a:endParaRPr kumimoji="0" lang="en-MY" altLang="zh-CN" sz="4400" b="1" i="0" u="none" strike="noStrike" kern="1200" cap="none" spc="0" normalizeH="0" baseline="0" noProof="0" dirty="0">
-              <a:ln>
-                <a:noFill/>
-              </a:ln>
-              <a:solidFill>
-                <a:srgbClr val="FFFFFF"/>
-              </a:solidFill>
-              <a:effectLst>
-                <a:outerShdw blurRad="38100" dist="38100" dir="2700000" algn="tl">
-                  <a:srgbClr val="000000">
-                    <a:alpha val="43137"/>
-                  </a:srgbClr>
-                </a:outerShdw>
-              </a:effectLst>
-              <a:uLnTx/>
-              <a:uFillTx/>
-              <a:latin typeface="KaiTi" pitchFamily="49" charset="-122"/>
-              <a:ea typeface="KaiTi" pitchFamily="49" charset="-122"/>
-              <a:cs typeface="+mn-cs"/>
-            </a:endParaRPr>
-          </a:p>
-          <a:p>
-            <a:pPr marL="0" marR="0" lvl="0" indent="0" algn="ctr" defTabSz="914353" rtl="0" eaLnBrk="1" fontAlgn="auto" latinLnBrk="0" hangingPunct="1">
-              <a:lnSpc>
-                <a:spcPct val="100000"/>
-              </a:lnSpc>
-              <a:spcBef>
-                <a:spcPts val="0"/>
-              </a:spcBef>
-              <a:spcAft>
-                <a:spcPts val="0"/>
-              </a:spcAft>
-              <a:buClrTx/>
-              <a:buSzTx/>
-              <a:buFontTx/>
-              <a:buNone/>
-              <a:tabLst/>
-              <a:defRPr/>
-            </a:pPr>
-            <a:r>
-              <a:rPr kumimoji="0" lang="en-MY" altLang="zh-CN" sz="2000" b="1" i="0" u="none" strike="noStrike" kern="1200" cap="none" spc="0" normalizeH="0" baseline="0" noProof="0" dirty="0">
-                <a:ln>
-                  <a:noFill/>
-                </a:ln>
-                <a:solidFill>
-                  <a:srgbClr val="4F81BD">
-                    <a:lumMod val="40000"/>
-                    <a:lumOff val="60000"/>
-                  </a:srgbClr>
-                </a:solidFill>
-                <a:effectLst>
-                  <a:outerShdw blurRad="38100" dist="38100" dir="2700000" algn="tl">
-                    <a:srgbClr val="000000">
-                      <a:alpha val="43137"/>
-                    </a:srgbClr>
-                  </a:outerShdw>
-                </a:effectLst>
-                <a:uLnTx/>
-                <a:uFillTx/>
-                <a:latin typeface="Calibri"/>
-                <a:ea typeface="KaiTi" pitchFamily="49" charset="-122"/>
-                <a:cs typeface="Arial" pitchFamily="34" charset="0"/>
-              </a:rPr>
-              <a:t> </a:t>
-            </a:r>
-          </a:p>
-          <a:p>
-            <a:pPr marL="0" marR="0" lvl="0" indent="0" algn="ctr" defTabSz="914353" rtl="0" eaLnBrk="1" fontAlgn="auto" latinLnBrk="0" hangingPunct="1">
-              <a:lnSpc>
-                <a:spcPct val="100000"/>
-              </a:lnSpc>
-              <a:spcBef>
-                <a:spcPts val="0"/>
-              </a:spcBef>
-              <a:spcAft>
-                <a:spcPts val="0"/>
-              </a:spcAft>
-              <a:buClrTx/>
-              <a:buSzTx/>
-              <a:buFontTx/>
-              <a:buNone/>
-              <a:tabLst/>
-              <a:defRPr/>
-            </a:pPr>
-            <a:r>
-              <a:rPr kumimoji="0" lang="en-MY" altLang="zh-CN" sz="2800" b="1" i="0" u="none" strike="noStrike" kern="1200" cap="none" spc="0" normalizeH="0" baseline="0" noProof="0" dirty="0">
-                <a:ln>
-                  <a:noFill/>
-                </a:ln>
-                <a:solidFill>
-                  <a:srgbClr val="4F81BD">
-                    <a:lumMod val="40000"/>
-                    <a:lumOff val="60000"/>
-                  </a:srgbClr>
-                </a:solidFill>
-                <a:effectLst>
-                  <a:outerShdw blurRad="38100" dist="38100" dir="2700000" algn="tl">
-                    <a:srgbClr val="000000">
-                      <a:alpha val="43137"/>
-                    </a:srgbClr>
-                  </a:outerShdw>
-                </a:effectLst>
-                <a:uLnTx/>
-                <a:uFillTx/>
-                <a:latin typeface="Calibri"/>
-                <a:ea typeface="KaiTi" pitchFamily="49" charset="-122"/>
-                <a:cs typeface="Arial" pitchFamily="34" charset="0"/>
-              </a:rPr>
-              <a:t> </a:t>
-            </a:r>
-            <a:r>
-              <a:rPr kumimoji="0" lang="en-US" altLang="zh-CN" sz="3200" b="1" i="0" u="none" strike="noStrike" kern="1200" cap="none" spc="0" normalizeH="0" baseline="30000" noProof="0" dirty="0">
-                <a:ln>
-                  <a:noFill/>
-                </a:ln>
-                <a:solidFill>
-                  <a:srgbClr val="FFFF00"/>
-                </a:solidFill>
-                <a:effectLst>
-                  <a:outerShdw blurRad="38100" dist="38100" dir="2700000" algn="tl">
-                    <a:srgbClr val="000000">
-                      <a:alpha val="43137"/>
-                    </a:srgbClr>
-                  </a:outerShdw>
-                </a:effectLst>
-                <a:uLnTx/>
-                <a:uFillTx/>
-                <a:latin typeface="KaiTi" pitchFamily="49" charset="-122"/>
-                <a:ea typeface="KaiTi" pitchFamily="49" charset="-122"/>
-                <a:cs typeface="+mn-cs"/>
-              </a:rPr>
-              <a:t>9 </a:t>
-            </a:r>
-            <a:r>
-              <a:rPr kumimoji="0" lang="en-US" altLang="zh-CN" sz="3200" b="0" i="0" u="none" strike="noStrike" kern="1200" cap="none" spc="0" normalizeH="0" baseline="0" noProof="0" dirty="0">
-                <a:ln>
-                  <a:noFill/>
-                </a:ln>
-                <a:solidFill>
-                  <a:srgbClr val="FFFFFF"/>
-                </a:solidFill>
-                <a:effectLst>
-                  <a:outerShdw blurRad="38100" dist="38100" dir="2700000" algn="tl">
-                    <a:srgbClr val="000000">
-                      <a:alpha val="43137"/>
-                    </a:srgbClr>
-                  </a:outerShdw>
-                </a:effectLst>
-                <a:uLnTx/>
-                <a:uFillTx/>
-                <a:latin typeface="Calibri"/>
-                <a:ea typeface="KaiTi" pitchFamily="49" charset="-122"/>
-                <a:cs typeface="Arial" pitchFamily="34" charset="0"/>
-              </a:rPr>
-              <a:t>And as Jesus passed forth from thence, he saw a man, named Matthew, sitting at the receipt of custom: and he saith unto him, Follow me. And he arose, and followed him.</a:t>
-            </a:r>
-          </a:p>
-        </p:txBody>
-      </p:sp>
-      <p:sp>
-        <p:nvSpPr>
-          <p:cNvPr id="5" name="overline">
-            <a:extLst>
-              <a:ext uri="{FF2B5EF4-FFF2-40B4-BE49-F238E27FC236}">
-                <a16:creationId xmlns:a16="http://schemas.microsoft.com/office/drawing/2014/main" id="{345F7F52-4CE1-DE58-E062-606E412C0823}"/>
-              </a:ext>
-            </a:extLst>
-          </p:cNvPr>
-          <p:cNvSpPr txBox="1"/>
-          <p:nvPr/>
-        </p:nvSpPr>
-        <p:spPr>
-          <a:xfrm>
-            <a:off x="406400" y="166256"/>
-            <a:ext cx="9833008" cy="584761"/>
-          </a:xfrm>
-          <a:prstGeom prst="rect">
-            <a:avLst/>
-          </a:prstGeom>
-          <a:noFill/>
-        </p:spPr>
-        <p:txBody>
-          <a:bodyPr wrap="square" lIns="91425" tIns="45713" rIns="91425" bIns="45713">
-            <a:spAutoFit/>
-          </a:bodyPr>
-          <a:lstStyle/>
-          <a:p>
-            <a:pPr marL="722313" marR="0" lvl="0" indent="-722313" algn="l" defTabSz="914400" rtl="0" eaLnBrk="1" fontAlgn="auto" latinLnBrk="0" hangingPunct="1">
-              <a:lnSpc>
-                <a:spcPct val="100000"/>
-              </a:lnSpc>
-              <a:spcBef>
-                <a:spcPct val="0"/>
-              </a:spcBef>
-              <a:spcAft>
-                <a:spcPts val="0"/>
-              </a:spcAft>
-              <a:buClrTx/>
-              <a:buSzTx/>
-              <a:buFontTx/>
-              <a:buNone/>
-              <a:tabLst/>
-              <a:defRPr/>
-            </a:pPr>
-            <a:r>
-              <a:rPr kumimoji="0" lang="zh-CN" altLang="en-MY" sz="3200" b="1" i="0" u="none" strike="noStrike" kern="1200" cap="none" spc="0" normalizeH="0" baseline="0" noProof="0" dirty="0">
-                <a:ln>
-                  <a:noFill/>
-                </a:ln>
-                <a:solidFill>
-                  <a:srgbClr val="FFFFFF"/>
-                </a:solidFill>
-                <a:effectLst/>
-                <a:uLnTx/>
-                <a:uFillTx/>
-                <a:latin typeface="经典圆体简" pitchFamily="49" charset="-122"/>
-                <a:ea typeface="经典圆体简" pitchFamily="49" charset="-122"/>
-                <a:cs typeface="经典圆体简" pitchFamily="49" charset="-122"/>
-              </a:rPr>
-              <a:t>马太福音</a:t>
-            </a:r>
-            <a:r>
-              <a:rPr kumimoji="0" lang="zh-CN" altLang="en-US" sz="3200" b="1" i="0" u="none" strike="noStrike" kern="1200" cap="none" spc="0" normalizeH="0" baseline="0" noProof="0" dirty="0">
-                <a:ln>
-                  <a:noFill/>
-                </a:ln>
-                <a:solidFill>
-                  <a:srgbClr val="FFFFFF"/>
-                </a:solidFill>
-                <a:effectLst/>
-                <a:uLnTx/>
-                <a:uFillTx/>
-                <a:latin typeface="经典圆体简" pitchFamily="49" charset="-122"/>
-                <a:ea typeface="经典圆体简" pitchFamily="49" charset="-122"/>
-                <a:cs typeface="经典圆体简" pitchFamily="49" charset="-122"/>
-              </a:rPr>
-              <a:t> </a:t>
-            </a:r>
-            <a:r>
-              <a:rPr kumimoji="0" lang="en-MY" altLang="zh-CN" sz="3200" b="1" i="0" u="none" strike="noStrike" kern="1200" cap="none" spc="0" normalizeH="0" baseline="0" noProof="0" dirty="0">
-                <a:ln>
-                  <a:noFill/>
-                </a:ln>
-                <a:solidFill>
-                  <a:srgbClr val="FFFFFF"/>
-                </a:solidFill>
-                <a:effectLst/>
-                <a:uLnTx/>
-                <a:uFillTx/>
-                <a:latin typeface="经典圆体简" pitchFamily="49" charset="-122"/>
-                <a:ea typeface="经典圆体简" pitchFamily="49" charset="-122"/>
-                <a:cs typeface="经典圆体简" pitchFamily="49" charset="-122"/>
-              </a:rPr>
-              <a:t>9:9-17</a:t>
-            </a:r>
-            <a:endParaRPr kumimoji="0" lang="zh-CN" altLang="en-US" sz="3200" b="1" i="0" u="none" strike="noStrike" kern="1200" cap="none" spc="0" normalizeH="0" baseline="0" noProof="0" dirty="0">
-              <a:ln>
-                <a:noFill/>
-              </a:ln>
-              <a:solidFill>
-                <a:srgbClr val="FFFFFF"/>
-              </a:solidFill>
-              <a:effectLst/>
-              <a:uLnTx/>
-              <a:uFillTx/>
-              <a:latin typeface="经典圆体简" pitchFamily="49" charset="-122"/>
-              <a:ea typeface="经典圆体简" pitchFamily="49" charset="-122"/>
-              <a:cs typeface="经典圆体简" pitchFamily="49" charset="-122"/>
-            </a:endParaRPr>
-          </a:p>
-        </p:txBody>
-      </p:sp>
-    </p:spTree>
-    <p:extLst>
-      <p:ext uri="{BB962C8B-B14F-4D97-AF65-F5344CB8AC3E}">
-        <p14:creationId xmlns:p14="http://schemas.microsoft.com/office/powerpoint/2010/main" val="1463811557"/>
-      </p:ext>
-    </p:extLst>
-  </p:cSld>
-  <p:clrMapOvr>
-    <a:masterClrMapping/>
-  </p:clrMapOvr>
-</p:sld>
-</file>
-
-<file path=ppt/slides/slide4.xml><?xml version="1.0" encoding="utf-8"?>
-<p:sld xmlns:a="http://schemas.openxmlformats.org/drawingml/2006/main" xmlns:r="http://schemas.openxmlformats.org/officeDocument/2006/relationships" xmlns:p="http://schemas.openxmlformats.org/presentationml/2006/main">
-  <p:cSld>
-    <p:spTree>
-      <p:nvGrpSpPr>
-        <p:cNvPr id="1" name=""/>
-        <p:cNvGrpSpPr/>
-        <p:nvPr/>
-      </p:nvGrpSpPr>
-      <p:grpSpPr>
-        <a:xfrm>
-          <a:off x="0" y="0"/>
-          <a:ext cx="0" cy="0"/>
-          <a:chOff x="0" y="0"/>
-          <a:chExt cx="0" cy="0"/>
-        </a:xfrm>
-      </p:grpSpPr>
-      <p:sp>
-        <p:nvSpPr>
-          <p:cNvPr id="2" name="TextBox 1"/>
-          <p:cNvSpPr txBox="1"/>
-          <p:nvPr/>
-        </p:nvSpPr>
-        <p:spPr>
-          <a:xfrm>
-            <a:off x="240145" y="129309"/>
-            <a:ext cx="10213573" cy="923330"/>
-          </a:xfrm>
-          <a:prstGeom prst="rect">
-            <a:avLst/>
-          </a:prstGeom>
-          <a:noFill/>
-        </p:spPr>
-        <p:txBody>
-          <a:bodyPr wrap="none">
-            <a:spAutoFit/>
-          </a:bodyPr>
-          <a:lstStyle/>
-          <a:p>
-            <a:endParaRPr/>
-          </a:p>
-          <a:p>
-            <a:pPr algn="l"/>
-            <a:r>
-              <a:rPr sz="5400" b="1">
-                <a:solidFill>
-                  <a:srgbClr val="FFFF00"/>
-                </a:solidFill>
-                <a:latin typeface="FZCuYuan-M03S"/>
-              </a:rPr>
-              <a:t>读经</a:t>
-            </a:r>
-          </a:p>
-        </p:txBody>
-      </p:sp>
-      <p:sp>
-        <p:nvSpPr>
-          <p:cNvPr id="3" name="TextBox 2"/>
-          <p:cNvSpPr txBox="1"/>
-          <p:nvPr/>
-        </p:nvSpPr>
-        <p:spPr>
-          <a:xfrm>
-            <a:off x="920142" y="1609907"/>
-            <a:ext cx="10272465" cy="2862322"/>
-          </a:xfrm>
-          <a:prstGeom prst="rect">
-            <a:avLst/>
-          </a:prstGeom>
-          <a:noFill/>
-        </p:spPr>
-        <p:txBody>
-          <a:bodyPr wrap="none">
-            <a:spAutoFit/>
-          </a:bodyPr>
-          <a:lstStyle/>
-          <a:p>
-            <a:endParaRPr/>
-          </a:p>
-          <a:p>
-            <a:pPr algn="ctr"/>
-            <a:r>
-              <a:rPr sz="6000" b="1" i="0" u="none">
-                <a:solidFill>
-                  <a:srgbClr val="FFFFFF"/>
-                </a:solidFill>
-                <a:latin typeface="FZCuYuan-M03S"/>
-              </a:rPr>
-              <a:t>马太福音</a:t>
-            </a:r>
-          </a:p>
-          <a:p>
-            <a:pPr algn="ctr"/>
-            <a:r>
-              <a:rPr sz="6000" b="1" i="0" u="none">
-                <a:solidFill>
-                  <a:srgbClr val="FFFFFF"/>
-                </a:solidFill>
-                <a:latin typeface="FZCuYuan-M03S"/>
-              </a:rPr>
-              <a:t>Matthew</a:t>
-            </a:r>
-          </a:p>
-          <a:p>
-            <a:pPr algn="ctr"/>
-            <a:r>
-              <a:rPr sz="6000" b="1" i="0" u="none">
-                <a:solidFill>
-                  <a:srgbClr val="FFFFFF"/>
-                </a:solidFill>
-                <a:latin typeface="FZCuYuan-M03S"/>
-              </a:rPr>
-              <a:t>9: 9-17</a:t>
-            </a:r>
-          </a:p>
-        </p:txBody>
-      </p:sp>
-    </p:spTree>
-  </p:cSld>
-  <p:clrMapOvr>
-    <a:masterClrMapping/>
-  </p:clrMapOvr>
-</p:sld>
-</file>
-
-<file path=ppt/slides/slide5.xml><?xml version="1.0" encoding="utf-8"?>
-<p:sld xmlns:a="http://schemas.openxmlformats.org/drawingml/2006/main" xmlns:r="http://schemas.openxmlformats.org/officeDocument/2006/relationships" xmlns:p="http://schemas.openxmlformats.org/presentationml/2006/main">
-  <p:cSld>
-    <p:bg>
-      <p:bgPr>
-        <a:solidFill>
-          <a:srgbClr val="000000"/>
-        </a:solidFill>
-        <a:effectLst/>
-      </p:bgPr>
-    </p:bg>
-    <p:spTree>
-      <p:nvGrpSpPr>
-        <p:cNvPr id="1" name=""/>
-        <p:cNvGrpSpPr/>
-        <p:nvPr/>
-      </p:nvGrpSpPr>
-      <p:grpSpPr>
-        <a:xfrm>
-          <a:off x="0" y="0"/>
-          <a:ext cx="0" cy="0"/>
-          <a:chOff x="0" y="0"/>
-          <a:chExt cx="0" cy="0"/>
-        </a:xfrm>
-      </p:grpSpPr>
-      <p:sp>
-        <p:nvSpPr>
-          <p:cNvPr id="2" name="TextBox 1"/>
-          <p:cNvSpPr txBox="1"/>
-          <p:nvPr/>
-        </p:nvSpPr>
-        <p:spPr>
-          <a:xfrm>
-            <a:off x="240145" y="129309"/>
-            <a:ext cx="10213573" cy="923330"/>
-          </a:xfrm>
-          <a:prstGeom prst="rect">
-            <a:avLst/>
-          </a:prstGeom>
-          <a:noFill/>
-        </p:spPr>
-        <p:txBody>
-          <a:bodyPr wrap="none">
-            <a:spAutoFit/>
-          </a:bodyPr>
-          <a:lstStyle/>
-          <a:p>
-            <a:endParaRPr/>
-          </a:p>
-          <a:p>
-            <a:pPr algn="l"/>
-            <a:r>
-              <a:rPr sz="5400" b="1">
-                <a:solidFill>
-                  <a:srgbClr val="FFFF00"/>
-                </a:solidFill>
-                <a:latin typeface="FZCuYuan-M03S"/>
-              </a:rPr>
-              <a:t>读经</a:t>
-            </a:r>
-          </a:p>
-        </p:txBody>
-      </p:sp>
-      <p:sp>
-        <p:nvSpPr>
-          <p:cNvPr id="3" name="TextBox 2"/>
-          <p:cNvSpPr txBox="1"/>
-          <p:nvPr/>
-        </p:nvSpPr>
-        <p:spPr>
-          <a:xfrm>
-            <a:off x="920142" y="1609907"/>
-            <a:ext cx="10272465" cy="2862322"/>
-          </a:xfrm>
-          <a:prstGeom prst="rect">
-            <a:avLst/>
-          </a:prstGeom>
-          <a:noFill/>
-        </p:spPr>
-        <p:txBody>
-          <a:bodyPr wrap="none">
-            <a:spAutoFit/>
-          </a:bodyPr>
-          <a:lstStyle/>
-          <a:p>
-            <a:endParaRPr/>
-          </a:p>
-          <a:p>
-            <a:pPr algn="ctr"/>
-            <a:r>
-              <a:rPr sz="6000" b="1" i="0" u="none">
-                <a:solidFill>
-                  <a:srgbClr val="FFFFFF"/>
-                </a:solidFill>
-                <a:latin typeface="FZCuYuan-M03S"/>
-              </a:rPr>
-              <a:t>马太福音</a:t>
-            </a:r>
-          </a:p>
-          <a:p>
-            <a:pPr algn="ctr"/>
-            <a:r>
-              <a:rPr sz="6000" b="1" i="0" u="none">
-                <a:solidFill>
-                  <a:srgbClr val="FFFFFF"/>
-                </a:solidFill>
-                <a:latin typeface="FZCuYuan-M03S"/>
-              </a:rPr>
-              <a:t>Matthew</a:t>
-            </a:r>
-          </a:p>
-          <a:p>
-            <a:pPr algn="ctr"/>
-            <a:r>
-              <a:rPr sz="6000" b="1" i="0" u="none">
-                <a:solidFill>
-                  <a:srgbClr val="FFFFFF"/>
-                </a:solidFill>
-                <a:latin typeface="FZCuYuan-M03S"/>
-              </a:rPr>
-              <a:t>9: 9-17</a:t>
-            </a:r>
-          </a:p>
-        </p:txBody>
-      </p:sp>
-    </p:spTree>
-  </p:cSld>
-  <p:clrMapOvr>
-    <a:masterClrMapping/>
-  </p:clrMapOvr>
-</p:sld>
-</file>
-
-<file path=ppt/slides/slide6.xml><?xml version="1.0" encoding="utf-8"?>
-<p:sld xmlns:a="http://schemas.openxmlformats.org/drawingml/2006/main" xmlns:r="http://schemas.openxmlformats.org/officeDocument/2006/relationships" xmlns:p="http://schemas.openxmlformats.org/presentationml/2006/main">
-  <p:cSld>
-    <p:bg>
-      <p:bgPr>
-        <a:solidFill>
-          <a:srgbClr val="000000"/>
-        </a:solidFill>
-        <a:effectLst/>
-      </p:bgPr>
-    </p:bg>
-    <p:spTree>
-      <p:nvGrpSpPr>
-        <p:cNvPr id="1" name=""/>
-        <p:cNvGrpSpPr/>
-        <p:nvPr/>
-      </p:nvGrpSpPr>
-      <p:grpSpPr>
-        <a:xfrm>
-          <a:off x="0" y="0"/>
-          <a:ext cx="0" cy="0"/>
-          <a:chOff x="0" y="0"/>
-          <a:chExt cx="0" cy="0"/>
-        </a:xfrm>
-      </p:grpSpPr>
-      <p:sp>
-        <p:nvSpPr>
-          <p:cNvPr id="2" name="TextBox 1"/>
-          <p:cNvSpPr txBox="1"/>
-          <p:nvPr/>
-        </p:nvSpPr>
-        <p:spPr>
-          <a:xfrm>
-            <a:off x="240145" y="129309"/>
-            <a:ext cx="10213573" cy="923330"/>
-          </a:xfrm>
-          <a:prstGeom prst="rect">
-            <a:avLst/>
-          </a:prstGeom>
-          <a:noFill/>
-        </p:spPr>
-        <p:txBody>
-          <a:bodyPr wrap="none">
-            <a:spAutoFit/>
-          </a:bodyPr>
-          <a:lstStyle/>
-          <a:p>
-            <a:endParaRPr/>
-          </a:p>
-          <a:p>
-            <a:pPr algn="l"/>
-            <a:r>
-              <a:rPr sz="5400" b="1">
-                <a:solidFill>
-                  <a:srgbClr val="FFFF00"/>
-                </a:solidFill>
-                <a:latin typeface="FZCuYuan-M03S"/>
-              </a:rPr>
-              <a:t>读经</a:t>
-            </a:r>
-          </a:p>
-        </p:txBody>
-      </p:sp>
-      <p:sp>
-        <p:nvSpPr>
-          <p:cNvPr id="3" name="TextBox 2"/>
-          <p:cNvSpPr txBox="1"/>
-          <p:nvPr/>
-        </p:nvSpPr>
-        <p:spPr>
-          <a:xfrm>
-            <a:off x="920142" y="1609907"/>
-            <a:ext cx="10272465" cy="2862322"/>
-          </a:xfrm>
-          <a:prstGeom prst="rect">
-            <a:avLst/>
-          </a:prstGeom>
-          <a:noFill/>
-        </p:spPr>
-        <p:txBody>
-          <a:bodyPr wrap="none">
-            <a:spAutoFit/>
-          </a:bodyPr>
-          <a:lstStyle/>
-          <a:p>
-            <a:endParaRPr/>
-          </a:p>
-          <a:p>
-            <a:pPr algn="ctr"/>
-            <a:r>
-              <a:rPr sz="6000" b="1" i="0" u="none">
-                <a:solidFill>
-                  <a:srgbClr val="FFFFFF"/>
-                </a:solidFill>
-                <a:latin typeface="FZCuYuan-M03S"/>
-              </a:rPr>
-              <a:t>马太福音</a:t>
-            </a:r>
-          </a:p>
-          <a:p>
-            <a:pPr algn="ctr"/>
-            <a:r>
-              <a:rPr sz="6000" b="1" i="0" u="none">
-                <a:solidFill>
-                  <a:srgbClr val="FFFFFF"/>
-                </a:solidFill>
-                <a:latin typeface="FZCuYuan-M03S"/>
-              </a:rPr>
-              <a:t>Matthew</a:t>
-            </a:r>
-          </a:p>
-          <a:p>
-            <a:pPr algn="ctr"/>
-            <a:r>
-              <a:rPr sz="6000" b="1" i="0" u="none">
-                <a:solidFill>
-                  <a:srgbClr val="FFFFFF"/>
-                </a:solidFill>
-                <a:latin typeface="FZCuYuan-M03S"/>
-              </a:rPr>
-              <a:t>9: 9-17</a:t>
-            </a:r>
-          </a:p>
-        </p:txBody>
-      </p:sp>
-    </p:spTree>
-  </p:cSld>
-  <p:clrMapOvr>
-    <a:masterClrMapping/>
-  </p:clrMapOvr>
-</p:sld>
-</file>
-
 <file path=ppt/theme/theme1.xml><?xml version="1.0" encoding="utf-8"?>
 <a:theme xmlns:a="http://schemas.openxmlformats.org/drawingml/2006/main" name="5_Office Theme">
   <a:themeElements>

</xml_diff>

<commit_message>
feat(context): handles multiple passages
</commit_message>
<xml_diff>
--- a/api/template/passage_template.pptx
+++ b/api/template/passage_template.pptx
@@ -6,7 +6,8 @@
   </p:sldMasterIdLst>
   <p:sldIdLst>
     <p:sldId id="13552" r:id="rId2"/>
-    <p:sldId id="13553" r:id="rId3"/>
+    <p:sldId id="13554" r:id="rId3"/>
+    <p:sldId id="13553" r:id="rId4"/>
   </p:sldIdLst>
   <p:sldSz cx="12192000" cy="6858000"/>
   <p:notesSz cx="6858000" cy="9144000"/>
@@ -287,7 +288,7 @@
                 <a:cs typeface="+mn-cs"/>
               </a:rPr>
               <a:pPr algn="l" rtl="0"/>
-              <a:t>7/1/2024</a:t>
+              <a:t>1/31/2025</a:t>
             </a:fld>
             <a:endParaRPr lang="en-US" sz="1200" kern="1200">
               <a:solidFill>
@@ -534,7 +535,7 @@
                 <a:cs typeface="+mn-cs"/>
               </a:rPr>
               <a:pPr algn="l" rtl="0"/>
-              <a:t>7/1/2024</a:t>
+              <a:t>1/31/2025</a:t>
             </a:fld>
             <a:endParaRPr lang="en-US" sz="1200" kern="1200">
               <a:solidFill>
@@ -762,7 +763,7 @@
                 <a:cs typeface="+mn-cs"/>
               </a:rPr>
               <a:pPr algn="l" rtl="0"/>
-              <a:t>7/1/2024</a:t>
+              <a:t>1/31/2025</a:t>
             </a:fld>
             <a:endParaRPr lang="en-US" sz="1200" kern="1200">
               <a:solidFill>
@@ -980,7 +981,7 @@
                 <a:cs typeface="+mn-cs"/>
               </a:rPr>
               <a:pPr algn="l" rtl="0"/>
-              <a:t>7/1/2024</a:t>
+              <a:t>1/31/2025</a:t>
             </a:fld>
             <a:endParaRPr lang="en-US" sz="1200" kern="1200">
               <a:solidFill>
@@ -1275,7 +1276,7 @@
                 <a:cs typeface="+mn-cs"/>
               </a:rPr>
               <a:pPr algn="l" rtl="0"/>
-              <a:t>7/1/2024</a:t>
+              <a:t>1/31/2025</a:t>
             </a:fld>
             <a:endParaRPr lang="en-US" sz="1200" kern="1200">
               <a:solidFill>
@@ -1610,7 +1611,7 @@
                 <a:cs typeface="+mn-cs"/>
               </a:rPr>
               <a:pPr algn="l" rtl="0"/>
-              <a:t>7/1/2024</a:t>
+              <a:t>1/31/2025</a:t>
             </a:fld>
             <a:endParaRPr lang="en-US" sz="1200" kern="1200">
               <a:solidFill>
@@ -2079,7 +2080,7 @@
                 <a:cs typeface="+mn-cs"/>
               </a:rPr>
               <a:pPr algn="l" rtl="0"/>
-              <a:t>7/1/2024</a:t>
+              <a:t>1/31/2025</a:t>
             </a:fld>
             <a:endParaRPr lang="en-US" sz="1200" kern="1200">
               <a:solidFill>
@@ -2246,7 +2247,7 @@
                 <a:cs typeface="+mn-cs"/>
               </a:rPr>
               <a:pPr algn="l" rtl="0"/>
-              <a:t>7/1/2024</a:t>
+              <a:t>1/31/2025</a:t>
             </a:fld>
             <a:endParaRPr lang="en-US" sz="1200" kern="1200">
               <a:solidFill>
@@ -2391,7 +2392,7 @@
                 <a:cs typeface="+mn-cs"/>
               </a:rPr>
               <a:pPr algn="l" rtl="0"/>
-              <a:t>7/1/2024</a:t>
+              <a:t>1/31/2025</a:t>
             </a:fld>
             <a:endParaRPr lang="en-US" sz="1200" kern="1200">
               <a:solidFill>
@@ -2716,7 +2717,7 @@
                 <a:cs typeface="+mn-cs"/>
               </a:rPr>
               <a:pPr algn="l" rtl="0"/>
-              <a:t>7/1/2024</a:t>
+              <a:t>1/31/2025</a:t>
             </a:fld>
             <a:endParaRPr lang="en-US" sz="1200" kern="1200">
               <a:solidFill>
@@ -3018,7 +3019,7 @@
                 <a:cs typeface="+mn-cs"/>
               </a:rPr>
               <a:pPr algn="l" rtl="0"/>
-              <a:t>7/1/2024</a:t>
+              <a:t>1/31/2025</a:t>
             </a:fld>
             <a:endParaRPr lang="en-US" sz="1200" kern="1200">
               <a:solidFill>
@@ -3279,7 +3280,7 @@
                 <a:cs typeface="+mn-cs"/>
               </a:rPr>
               <a:pPr rtl="0"/>
-              <a:t>7/1/2024</a:t>
+              <a:t>1/31/2025</a:t>
             </a:fld>
             <a:endParaRPr lang="en-US" kern="1200">
               <a:solidFill>
@@ -4033,6 +4034,646 @@
 
 <file path=ppt/slides/slide2.xml><?xml version="1.0" encoding="utf-8"?>
 <p:sld xmlns:a="http://schemas.openxmlformats.org/drawingml/2006/main" xmlns:r="http://schemas.openxmlformats.org/officeDocument/2006/relationships" xmlns:p="http://schemas.openxmlformats.org/presentationml/2006/main">
+  <p:cSld>
+    <p:bg>
+      <p:bgPr>
+        <a:solidFill>
+          <a:srgbClr val="000000"/>
+        </a:solidFill>
+        <a:effectLst/>
+      </p:bgPr>
+    </p:bg>
+    <p:spTree>
+      <p:nvGrpSpPr>
+        <p:cNvPr id="1" name="">
+          <a:extLst>
+            <a:ext uri="{FF2B5EF4-FFF2-40B4-BE49-F238E27FC236}">
+              <a16:creationId xmlns:a16="http://schemas.microsoft.com/office/drawing/2014/main" id="{0A2D35BC-6C27-F822-6E55-C9C34925D5B0}"/>
+            </a:ext>
+          </a:extLst>
+        </p:cNvPr>
+        <p:cNvGrpSpPr/>
+        <p:nvPr/>
+      </p:nvGrpSpPr>
+      <p:grpSpPr>
+        <a:xfrm>
+          <a:off x="0" y="0"/>
+          <a:ext cx="0" cy="0"/>
+          <a:chOff x="0" y="0"/>
+          <a:chExt cx="0" cy="0"/>
+        </a:xfrm>
+      </p:grpSpPr>
+      <p:sp>
+        <p:nvSpPr>
+          <p:cNvPr id="2" name="overline">
+            <a:extLst>
+              <a:ext uri="{FF2B5EF4-FFF2-40B4-BE49-F238E27FC236}">
+                <a16:creationId xmlns:a16="http://schemas.microsoft.com/office/drawing/2014/main" id="{4EE55039-480F-4059-3A83-BBA9C32CC86E}"/>
+              </a:ext>
+            </a:extLst>
+          </p:cNvPr>
+          <p:cNvSpPr>
+            <a:spLocks noGrp="1"/>
+          </p:cNvSpPr>
+          <p:nvPr>
+            <p:ph type="ctrTitle"/>
+          </p:nvPr>
+        </p:nvSpPr>
+        <p:spPr>
+          <a:xfrm>
+            <a:off x="240145" y="129309"/>
+            <a:ext cx="10213573" cy="646331"/>
+          </a:xfrm>
+        </p:spPr>
+        <p:txBody>
+          <a:bodyPr wrap="square" anchor="t">
+            <a:spAutoFit/>
+          </a:bodyPr>
+          <a:lstStyle/>
+          <a:p>
+            <a:pPr algn="l"/>
+            <a:r>
+              <a:rPr lang="en-US" sz="3600" b="1" dirty="0" err="1">
+                <a:ln w="28575" cmpd="sng">
+                  <a:noFill/>
+                  <a:prstDash val="solid"/>
+                </a:ln>
+                <a:solidFill>
+                  <a:srgbClr val="FFFF00"/>
+                </a:solidFill>
+                <a:effectLst>
+                  <a:outerShdw blurRad="63500" dir="3600000" algn="tl" rotWithShape="0">
+                    <a:srgbClr val="000000">
+                      <a:alpha val="70000"/>
+                    </a:srgbClr>
+                  </a:outerShdw>
+                </a:effectLst>
+                <a:latin typeface="Maiandra GD" pitchFamily="34" charset="0"/>
+                <a:ea typeface="FZCuYuan-M03S" pitchFamily="65" charset="-122"/>
+              </a:rPr>
+              <a:t>two_passage_cover</a:t>
+            </a:r>
+            <a:endParaRPr lang="en-US" sz="3600" b="1" dirty="0">
+              <a:ln w="28575" cmpd="sng">
+                <a:noFill/>
+                <a:prstDash val="solid"/>
+              </a:ln>
+              <a:solidFill>
+                <a:srgbClr val="FFFF00"/>
+              </a:solidFill>
+              <a:effectLst>
+                <a:outerShdw blurRad="63500" dir="3600000" algn="tl" rotWithShape="0">
+                  <a:srgbClr val="000000">
+                    <a:alpha val="70000"/>
+                  </a:srgbClr>
+                </a:outerShdw>
+              </a:effectLst>
+              <a:latin typeface="Maiandra GD" pitchFamily="34" charset="0"/>
+              <a:ea typeface="FZCuYuan-M03S" pitchFamily="65" charset="-122"/>
+            </a:endParaRPr>
+          </a:p>
+        </p:txBody>
+      </p:sp>
+      <p:grpSp>
+        <p:nvGrpSpPr>
+          <p:cNvPr id="6" name="Group 5">
+            <a:extLst>
+              <a:ext uri="{FF2B5EF4-FFF2-40B4-BE49-F238E27FC236}">
+                <a16:creationId xmlns:a16="http://schemas.microsoft.com/office/drawing/2014/main" id="{137A156E-2A64-D74B-E8C2-2863431FDDC6}"/>
+              </a:ext>
+            </a:extLst>
+          </p:cNvPr>
+          <p:cNvGrpSpPr/>
+          <p:nvPr/>
+        </p:nvGrpSpPr>
+        <p:grpSpPr>
+          <a:xfrm>
+            <a:off x="1001865" y="1728660"/>
+            <a:ext cx="10188270" cy="2585323"/>
+            <a:chOff x="735051" y="1609907"/>
+            <a:chExt cx="10188270" cy="2585323"/>
+          </a:xfrm>
+        </p:grpSpPr>
+        <p:sp>
+          <p:nvSpPr>
+            <p:cNvPr id="3" name="title">
+              <a:extLst>
+                <a:ext uri="{FF2B5EF4-FFF2-40B4-BE49-F238E27FC236}">
+                  <a16:creationId xmlns:a16="http://schemas.microsoft.com/office/drawing/2014/main" id="{58E37EF3-E785-A33A-12F0-EE5F40928322}"/>
+                </a:ext>
+              </a:extLst>
+            </p:cNvPr>
+            <p:cNvSpPr txBox="1">
+              <a:spLocks/>
+            </p:cNvSpPr>
+            <p:nvPr/>
+          </p:nvSpPr>
+          <p:spPr>
+            <a:xfrm>
+              <a:off x="735051" y="1609907"/>
+              <a:ext cx="4451366" cy="2585323"/>
+            </a:xfrm>
+            <a:prstGeom prst="rect">
+              <a:avLst/>
+            </a:prstGeom>
+          </p:spPr>
+          <p:txBody>
+            <a:bodyPr vert="horz" wrap="square" lIns="91440" tIns="45720" rIns="91440" bIns="45720" rtlCol="0" anchor="t">
+              <a:spAutoFit/>
+            </a:bodyPr>
+            <a:lstStyle/>
+            <a:p>
+              <a:pPr marL="0" marR="0" lvl="0" indent="0" algn="ctr" defTabSz="914400" rtl="0" eaLnBrk="1" fontAlgn="auto" latinLnBrk="0" hangingPunct="1">
+                <a:lnSpc>
+                  <a:spcPct val="100000"/>
+                </a:lnSpc>
+                <a:spcBef>
+                  <a:spcPct val="0"/>
+                </a:spcBef>
+                <a:spcAft>
+                  <a:spcPts val="0"/>
+                </a:spcAft>
+                <a:buClrTx/>
+                <a:buSzTx/>
+                <a:buFontTx/>
+                <a:buNone/>
+                <a:tabLst/>
+                <a:defRPr/>
+              </a:pPr>
+              <a:r>
+                <a:rPr lang="en-MY" altLang="zh-CN" sz="5400" b="1" dirty="0">
+                  <a:ln w="28575" cmpd="sng">
+                    <a:noFill/>
+                    <a:prstDash val="solid"/>
+                  </a:ln>
+                  <a:solidFill>
+                    <a:srgbClr val="FFFFFF"/>
+                  </a:solidFill>
+                  <a:effectLst>
+                    <a:glow rad="63500">
+                      <a:prstClr val="black">
+                        <a:lumMod val="85000"/>
+                        <a:lumOff val="15000"/>
+                        <a:alpha val="40000"/>
+                      </a:prstClr>
+                    </a:glow>
+                    <a:outerShdw blurRad="63500" dir="3600000" algn="tl" rotWithShape="0">
+                      <a:srgbClr val="000000">
+                        <a:alpha val="70000"/>
+                      </a:srgbClr>
+                    </a:outerShdw>
+                  </a:effectLst>
+                  <a:latin typeface="KaiTi" panose="02010609060101010101" pitchFamily="49" charset="-122"/>
+                  <a:ea typeface="KaiTi" panose="02010609060101010101" pitchFamily="49" charset="-122"/>
+                </a:rPr>
+                <a:t>@chi_book1@</a:t>
+              </a:r>
+              <a:endParaRPr kumimoji="0" lang="en-MY" altLang="zh-CN" sz="5400" b="1" i="0" u="none" strike="noStrike" kern="1200" cap="none" spc="0" normalizeH="0" baseline="0" noProof="0" dirty="0">
+                <a:ln w="28575" cmpd="sng">
+                  <a:noFill/>
+                  <a:prstDash val="solid"/>
+                </a:ln>
+                <a:solidFill>
+                  <a:srgbClr val="FFFFFF"/>
+                </a:solidFill>
+                <a:effectLst>
+                  <a:glow rad="63500">
+                    <a:prstClr val="black">
+                      <a:lumMod val="85000"/>
+                      <a:lumOff val="15000"/>
+                      <a:alpha val="40000"/>
+                    </a:prstClr>
+                  </a:glow>
+                  <a:outerShdw blurRad="63500" dir="3600000" algn="tl" rotWithShape="0">
+                    <a:srgbClr val="000000">
+                      <a:alpha val="70000"/>
+                    </a:srgbClr>
+                  </a:outerShdw>
+                </a:effectLst>
+                <a:uLnTx/>
+                <a:uFillTx/>
+                <a:latin typeface="KaiTi" panose="02010609060101010101" pitchFamily="49" charset="-122"/>
+                <a:ea typeface="KaiTi" panose="02010609060101010101" pitchFamily="49" charset="-122"/>
+              </a:endParaRPr>
+            </a:p>
+            <a:p>
+              <a:pPr marL="0" marR="0" lvl="0" indent="0" algn="ctr" defTabSz="914400" rtl="0" eaLnBrk="1" fontAlgn="auto" latinLnBrk="0" hangingPunct="1">
+                <a:lnSpc>
+                  <a:spcPct val="100000"/>
+                </a:lnSpc>
+                <a:spcBef>
+                  <a:spcPct val="0"/>
+                </a:spcBef>
+                <a:spcAft>
+                  <a:spcPts val="0"/>
+                </a:spcAft>
+                <a:buClrTx/>
+                <a:buSzTx/>
+                <a:buFontTx/>
+                <a:buNone/>
+                <a:tabLst/>
+                <a:defRPr/>
+              </a:pPr>
+              <a:r>
+                <a:rPr lang="en-US" altLang="zh-CN" sz="5400" b="1" dirty="0">
+                  <a:ln w="28575" cmpd="sng">
+                    <a:noFill/>
+                    <a:prstDash val="solid"/>
+                  </a:ln>
+                  <a:solidFill>
+                    <a:srgbClr val="FFFFFF"/>
+                  </a:solidFill>
+                  <a:effectLst>
+                    <a:glow rad="63500">
+                      <a:prstClr val="black">
+                        <a:lumMod val="85000"/>
+                        <a:lumOff val="15000"/>
+                        <a:alpha val="40000"/>
+                      </a:prstClr>
+                    </a:glow>
+                    <a:outerShdw blurRad="63500" dir="3600000" algn="tl" rotWithShape="0">
+                      <a:srgbClr val="000000">
+                        <a:alpha val="70000"/>
+                      </a:srgbClr>
+                    </a:outerShdw>
+                  </a:effectLst>
+                  <a:latin typeface="KaiTi" panose="02010609060101010101" pitchFamily="49" charset="-122"/>
+                  <a:ea typeface="KaiTi" panose="02010609060101010101" pitchFamily="49" charset="-122"/>
+                </a:rPr>
+                <a:t>@eng_book1@</a:t>
+              </a:r>
+              <a:endParaRPr kumimoji="0" lang="en-MY" altLang="zh-CN" sz="5400" b="1" i="0" u="none" strike="noStrike" kern="1200" cap="none" spc="0" normalizeH="0" baseline="0" noProof="0" dirty="0">
+                <a:ln w="28575" cmpd="sng">
+                  <a:noFill/>
+                  <a:prstDash val="solid"/>
+                </a:ln>
+                <a:solidFill>
+                  <a:srgbClr val="FFFFFF"/>
+                </a:solidFill>
+                <a:effectLst>
+                  <a:glow rad="63500">
+                    <a:prstClr val="black">
+                      <a:lumMod val="85000"/>
+                      <a:lumOff val="15000"/>
+                      <a:alpha val="40000"/>
+                    </a:prstClr>
+                  </a:glow>
+                  <a:outerShdw blurRad="63500" dir="3600000" algn="tl" rotWithShape="0">
+                    <a:srgbClr val="000000">
+                      <a:alpha val="70000"/>
+                    </a:srgbClr>
+                  </a:outerShdw>
+                </a:effectLst>
+                <a:uLnTx/>
+                <a:uFillTx/>
+                <a:latin typeface="KaiTi" panose="02010609060101010101" pitchFamily="49" charset="-122"/>
+                <a:ea typeface="KaiTi" panose="02010609060101010101" pitchFamily="49" charset="-122"/>
+              </a:endParaRPr>
+            </a:p>
+            <a:p>
+              <a:pPr marL="0" marR="0" lvl="0" indent="0" algn="ctr" defTabSz="914400" rtl="0" eaLnBrk="1" fontAlgn="auto" latinLnBrk="0" hangingPunct="1">
+                <a:lnSpc>
+                  <a:spcPct val="100000"/>
+                </a:lnSpc>
+                <a:spcBef>
+                  <a:spcPct val="0"/>
+                </a:spcBef>
+                <a:spcAft>
+                  <a:spcPts val="0"/>
+                </a:spcAft>
+                <a:buClrTx/>
+                <a:buSzTx/>
+                <a:buFontTx/>
+                <a:buNone/>
+                <a:tabLst/>
+                <a:defRPr/>
+              </a:pPr>
+              <a:r>
+                <a:rPr lang="en-US" altLang="zh-CN" sz="5400" b="1" dirty="0">
+                  <a:ln w="28575" cmpd="sng">
+                    <a:noFill/>
+                    <a:prstDash val="solid"/>
+                  </a:ln>
+                  <a:solidFill>
+                    <a:srgbClr val="FFFFFF"/>
+                  </a:solidFill>
+                  <a:effectLst>
+                    <a:glow rad="63500">
+                      <a:prstClr val="black">
+                        <a:lumMod val="85000"/>
+                        <a:lumOff val="15000"/>
+                        <a:alpha val="40000"/>
+                      </a:prstClr>
+                    </a:glow>
+                    <a:outerShdw blurRad="63500" dir="3600000" algn="tl" rotWithShape="0">
+                      <a:srgbClr val="000000">
+                        <a:alpha val="70000"/>
+                      </a:srgbClr>
+                    </a:outerShdw>
+                  </a:effectLst>
+                  <a:latin typeface="KaiTi" panose="02010609060101010101" pitchFamily="49" charset="-122"/>
+                  <a:ea typeface="KaiTi" panose="02010609060101010101" pitchFamily="49" charset="-122"/>
+                </a:rPr>
+                <a:t>@verse1@</a:t>
+              </a:r>
+              <a:endParaRPr kumimoji="0" lang="en-US" altLang="zh-CN" sz="5400" b="1" i="0" u="none" strike="noStrike" kern="1200" cap="none" spc="0" normalizeH="0" baseline="0" noProof="0" dirty="0">
+                <a:ln w="28575" cmpd="sng">
+                  <a:noFill/>
+                  <a:prstDash val="solid"/>
+                </a:ln>
+                <a:solidFill>
+                  <a:srgbClr val="FFFFFF"/>
+                </a:solidFill>
+                <a:effectLst>
+                  <a:glow rad="63500">
+                    <a:prstClr val="black">
+                      <a:lumMod val="85000"/>
+                      <a:lumOff val="15000"/>
+                      <a:alpha val="40000"/>
+                    </a:prstClr>
+                  </a:glow>
+                  <a:outerShdw blurRad="63500" dir="3600000" algn="tl" rotWithShape="0">
+                    <a:srgbClr val="000000">
+                      <a:alpha val="70000"/>
+                    </a:srgbClr>
+                  </a:outerShdw>
+                </a:effectLst>
+                <a:uLnTx/>
+                <a:uFillTx/>
+                <a:latin typeface="KaiTi" panose="02010609060101010101" pitchFamily="49" charset="-122"/>
+                <a:ea typeface="KaiTi" panose="02010609060101010101" pitchFamily="49" charset="-122"/>
+              </a:endParaRPr>
+            </a:p>
+          </p:txBody>
+        </p:sp>
+        <p:sp>
+          <p:nvSpPr>
+            <p:cNvPr id="4" name="title">
+              <a:extLst>
+                <a:ext uri="{FF2B5EF4-FFF2-40B4-BE49-F238E27FC236}">
+                  <a16:creationId xmlns:a16="http://schemas.microsoft.com/office/drawing/2014/main" id="{52E111FD-BEF8-9793-40B1-A4E7D694380F}"/>
+                </a:ext>
+              </a:extLst>
+            </p:cNvPr>
+            <p:cNvSpPr txBox="1">
+              <a:spLocks/>
+            </p:cNvSpPr>
+            <p:nvPr/>
+          </p:nvSpPr>
+          <p:spPr>
+            <a:xfrm>
+              <a:off x="6471955" y="1609907"/>
+              <a:ext cx="4451366" cy="2585323"/>
+            </a:xfrm>
+            <a:prstGeom prst="rect">
+              <a:avLst/>
+            </a:prstGeom>
+          </p:spPr>
+          <p:txBody>
+            <a:bodyPr vert="horz" wrap="square" lIns="91440" tIns="45720" rIns="91440" bIns="45720" rtlCol="0" anchor="t">
+              <a:spAutoFit/>
+            </a:bodyPr>
+            <a:lstStyle/>
+            <a:p>
+              <a:pPr marL="0" marR="0" lvl="0" indent="0" algn="ctr" defTabSz="914400" rtl="0" eaLnBrk="1" fontAlgn="auto" latinLnBrk="0" hangingPunct="1">
+                <a:lnSpc>
+                  <a:spcPct val="100000"/>
+                </a:lnSpc>
+                <a:spcBef>
+                  <a:spcPct val="0"/>
+                </a:spcBef>
+                <a:spcAft>
+                  <a:spcPts val="0"/>
+                </a:spcAft>
+                <a:buClrTx/>
+                <a:buSzTx/>
+                <a:buFontTx/>
+                <a:buNone/>
+                <a:tabLst/>
+                <a:defRPr/>
+              </a:pPr>
+              <a:r>
+                <a:rPr lang="en-MY" altLang="zh-CN" sz="5400" b="1" dirty="0">
+                  <a:ln w="28575" cmpd="sng">
+                    <a:noFill/>
+                    <a:prstDash val="solid"/>
+                  </a:ln>
+                  <a:solidFill>
+                    <a:srgbClr val="FFFFFF"/>
+                  </a:solidFill>
+                  <a:effectLst>
+                    <a:glow rad="63500">
+                      <a:prstClr val="black">
+                        <a:lumMod val="85000"/>
+                        <a:lumOff val="15000"/>
+                        <a:alpha val="40000"/>
+                      </a:prstClr>
+                    </a:glow>
+                    <a:outerShdw blurRad="63500" dir="3600000" algn="tl" rotWithShape="0">
+                      <a:srgbClr val="000000">
+                        <a:alpha val="70000"/>
+                      </a:srgbClr>
+                    </a:outerShdw>
+                  </a:effectLst>
+                  <a:latin typeface="KaiTi" panose="02010609060101010101" pitchFamily="49" charset="-122"/>
+                  <a:ea typeface="KaiTi" panose="02010609060101010101" pitchFamily="49" charset="-122"/>
+                </a:rPr>
+                <a:t>@chi_book2@</a:t>
+              </a:r>
+              <a:endParaRPr kumimoji="0" lang="en-MY" altLang="zh-CN" sz="5400" b="1" i="0" u="none" strike="noStrike" kern="1200" cap="none" spc="0" normalizeH="0" baseline="0" noProof="0" dirty="0">
+                <a:ln w="28575" cmpd="sng">
+                  <a:noFill/>
+                  <a:prstDash val="solid"/>
+                </a:ln>
+                <a:solidFill>
+                  <a:srgbClr val="FFFFFF"/>
+                </a:solidFill>
+                <a:effectLst>
+                  <a:glow rad="63500">
+                    <a:prstClr val="black">
+                      <a:lumMod val="85000"/>
+                      <a:lumOff val="15000"/>
+                      <a:alpha val="40000"/>
+                    </a:prstClr>
+                  </a:glow>
+                  <a:outerShdw blurRad="63500" dir="3600000" algn="tl" rotWithShape="0">
+                    <a:srgbClr val="000000">
+                      <a:alpha val="70000"/>
+                    </a:srgbClr>
+                  </a:outerShdw>
+                </a:effectLst>
+                <a:uLnTx/>
+                <a:uFillTx/>
+                <a:latin typeface="KaiTi" panose="02010609060101010101" pitchFamily="49" charset="-122"/>
+                <a:ea typeface="KaiTi" panose="02010609060101010101" pitchFamily="49" charset="-122"/>
+              </a:endParaRPr>
+            </a:p>
+            <a:p>
+              <a:pPr marL="0" marR="0" lvl="0" indent="0" algn="ctr" defTabSz="914400" rtl="0" eaLnBrk="1" fontAlgn="auto" latinLnBrk="0" hangingPunct="1">
+                <a:lnSpc>
+                  <a:spcPct val="100000"/>
+                </a:lnSpc>
+                <a:spcBef>
+                  <a:spcPct val="0"/>
+                </a:spcBef>
+                <a:spcAft>
+                  <a:spcPts val="0"/>
+                </a:spcAft>
+                <a:buClrTx/>
+                <a:buSzTx/>
+                <a:buFontTx/>
+                <a:buNone/>
+                <a:tabLst/>
+                <a:defRPr/>
+              </a:pPr>
+              <a:r>
+                <a:rPr lang="en-US" altLang="zh-CN" sz="5400" b="1" dirty="0">
+                  <a:ln w="28575" cmpd="sng">
+                    <a:noFill/>
+                    <a:prstDash val="solid"/>
+                  </a:ln>
+                  <a:solidFill>
+                    <a:srgbClr val="FFFFFF"/>
+                  </a:solidFill>
+                  <a:effectLst>
+                    <a:glow rad="63500">
+                      <a:prstClr val="black">
+                        <a:lumMod val="85000"/>
+                        <a:lumOff val="15000"/>
+                        <a:alpha val="40000"/>
+                      </a:prstClr>
+                    </a:glow>
+                    <a:outerShdw blurRad="63500" dir="3600000" algn="tl" rotWithShape="0">
+                      <a:srgbClr val="000000">
+                        <a:alpha val="70000"/>
+                      </a:srgbClr>
+                    </a:outerShdw>
+                  </a:effectLst>
+                  <a:latin typeface="KaiTi" panose="02010609060101010101" pitchFamily="49" charset="-122"/>
+                  <a:ea typeface="KaiTi" panose="02010609060101010101" pitchFamily="49" charset="-122"/>
+                </a:rPr>
+                <a:t>@eng_book2@</a:t>
+              </a:r>
+              <a:endParaRPr kumimoji="0" lang="en-MY" altLang="zh-CN" sz="5400" b="1" i="0" u="none" strike="noStrike" kern="1200" cap="none" spc="0" normalizeH="0" baseline="0" noProof="0" dirty="0">
+                <a:ln w="28575" cmpd="sng">
+                  <a:noFill/>
+                  <a:prstDash val="solid"/>
+                </a:ln>
+                <a:solidFill>
+                  <a:srgbClr val="FFFFFF"/>
+                </a:solidFill>
+                <a:effectLst>
+                  <a:glow rad="63500">
+                    <a:prstClr val="black">
+                      <a:lumMod val="85000"/>
+                      <a:lumOff val="15000"/>
+                      <a:alpha val="40000"/>
+                    </a:prstClr>
+                  </a:glow>
+                  <a:outerShdw blurRad="63500" dir="3600000" algn="tl" rotWithShape="0">
+                    <a:srgbClr val="000000">
+                      <a:alpha val="70000"/>
+                    </a:srgbClr>
+                  </a:outerShdw>
+                </a:effectLst>
+                <a:uLnTx/>
+                <a:uFillTx/>
+                <a:latin typeface="KaiTi" panose="02010609060101010101" pitchFamily="49" charset="-122"/>
+                <a:ea typeface="KaiTi" panose="02010609060101010101" pitchFamily="49" charset="-122"/>
+              </a:endParaRPr>
+            </a:p>
+            <a:p>
+              <a:pPr marL="0" marR="0" lvl="0" indent="0" algn="ctr" defTabSz="914400" rtl="0" eaLnBrk="1" fontAlgn="auto" latinLnBrk="0" hangingPunct="1">
+                <a:lnSpc>
+                  <a:spcPct val="100000"/>
+                </a:lnSpc>
+                <a:spcBef>
+                  <a:spcPct val="0"/>
+                </a:spcBef>
+                <a:spcAft>
+                  <a:spcPts val="0"/>
+                </a:spcAft>
+                <a:buClrTx/>
+                <a:buSzTx/>
+                <a:buFontTx/>
+                <a:buNone/>
+                <a:tabLst/>
+                <a:defRPr/>
+              </a:pPr>
+              <a:r>
+                <a:rPr lang="en-US" altLang="zh-CN" sz="5400" b="1" dirty="0">
+                  <a:ln w="28575" cmpd="sng">
+                    <a:noFill/>
+                    <a:prstDash val="solid"/>
+                  </a:ln>
+                  <a:solidFill>
+                    <a:srgbClr val="FFFFFF"/>
+                  </a:solidFill>
+                  <a:effectLst>
+                    <a:glow rad="63500">
+                      <a:prstClr val="black">
+                        <a:lumMod val="85000"/>
+                        <a:lumOff val="15000"/>
+                        <a:alpha val="40000"/>
+                      </a:prstClr>
+                    </a:glow>
+                    <a:outerShdw blurRad="63500" dir="3600000" algn="tl" rotWithShape="0">
+                      <a:srgbClr val="000000">
+                        <a:alpha val="70000"/>
+                      </a:srgbClr>
+                    </a:outerShdw>
+                  </a:effectLst>
+                  <a:latin typeface="KaiTi" panose="02010609060101010101" pitchFamily="49" charset="-122"/>
+                  <a:ea typeface="KaiTi" panose="02010609060101010101" pitchFamily="49" charset="-122"/>
+                </a:rPr>
+                <a:t>@verse2@</a:t>
+              </a:r>
+              <a:endParaRPr kumimoji="0" lang="en-US" altLang="zh-CN" sz="5400" b="1" i="0" u="none" strike="noStrike" kern="1200" cap="none" spc="0" normalizeH="0" baseline="0" noProof="0" dirty="0">
+                <a:ln w="28575" cmpd="sng">
+                  <a:noFill/>
+                  <a:prstDash val="solid"/>
+                </a:ln>
+                <a:solidFill>
+                  <a:srgbClr val="FFFFFF"/>
+                </a:solidFill>
+                <a:effectLst>
+                  <a:glow rad="63500">
+                    <a:prstClr val="black">
+                      <a:lumMod val="85000"/>
+                      <a:lumOff val="15000"/>
+                      <a:alpha val="40000"/>
+                    </a:prstClr>
+                  </a:glow>
+                  <a:outerShdw blurRad="63500" dir="3600000" algn="tl" rotWithShape="0">
+                    <a:srgbClr val="000000">
+                      <a:alpha val="70000"/>
+                    </a:srgbClr>
+                  </a:outerShdw>
+                </a:effectLst>
+                <a:uLnTx/>
+                <a:uFillTx/>
+                <a:latin typeface="KaiTi" panose="02010609060101010101" pitchFamily="49" charset="-122"/>
+                <a:ea typeface="KaiTi" panose="02010609060101010101" pitchFamily="49" charset="-122"/>
+              </a:endParaRPr>
+            </a:p>
+          </p:txBody>
+        </p:sp>
+      </p:grpSp>
+    </p:spTree>
+    <p:extLst>
+      <p:ext uri="{BB962C8B-B14F-4D97-AF65-F5344CB8AC3E}">
+        <p14:creationId xmlns:p14="http://schemas.microsoft.com/office/powerpoint/2010/main" val="3936670738"/>
+      </p:ext>
+    </p:extLst>
+  </p:cSld>
+  <p:clrMapOvr>
+    <a:masterClrMapping/>
+  </p:clrMapOvr>
+</p:sld>
+</file>
+
+<file path=ppt/slides/slide3.xml><?xml version="1.0" encoding="utf-8"?>
+<p:sld xmlns:a="http://schemas.openxmlformats.org/drawingml/2006/main" xmlns:r="http://schemas.openxmlformats.org/officeDocument/2006/relationships" xmlns:p="http://schemas.openxmlformats.org/presentationml/2006/main">
   <p:cSld name="something">
     <p:bg>
       <p:bgPr>

</xml_diff>

<commit_message>
chore(template): tidy up the format of the textbox and font
</commit_message>
<xml_diff>
--- a/api/template/passage_template.pptx
+++ b/api/template/passage_template.pptx
@@ -6,8 +6,7 @@
   </p:sldMasterIdLst>
   <p:sldIdLst>
     <p:sldId id="13552" r:id="rId2"/>
-    <p:sldId id="13554" r:id="rId3"/>
-    <p:sldId id="13553" r:id="rId4"/>
+    <p:sldId id="13553" r:id="rId3"/>
   </p:sldIdLst>
   <p:sldSz cx="12192000" cy="6858000"/>
   <p:notesSz cx="6858000" cy="9144000"/>
@@ -288,7 +287,7 @@
                 <a:cs typeface="+mn-cs"/>
               </a:rPr>
               <a:pPr algn="l" rtl="0"/>
-              <a:t>1/31/2025</a:t>
+              <a:t>3/2/2025</a:t>
             </a:fld>
             <a:endParaRPr lang="en-US" sz="1200" kern="1200">
               <a:solidFill>
@@ -535,7 +534,7 @@
                 <a:cs typeface="+mn-cs"/>
               </a:rPr>
               <a:pPr algn="l" rtl="0"/>
-              <a:t>1/31/2025</a:t>
+              <a:t>3/2/2025</a:t>
             </a:fld>
             <a:endParaRPr lang="en-US" sz="1200" kern="1200">
               <a:solidFill>
@@ -763,7 +762,7 @@
                 <a:cs typeface="+mn-cs"/>
               </a:rPr>
               <a:pPr algn="l" rtl="0"/>
-              <a:t>1/31/2025</a:t>
+              <a:t>3/2/2025</a:t>
             </a:fld>
             <a:endParaRPr lang="en-US" sz="1200" kern="1200">
               <a:solidFill>
@@ -981,7 +980,7 @@
                 <a:cs typeface="+mn-cs"/>
               </a:rPr>
               <a:pPr algn="l" rtl="0"/>
-              <a:t>1/31/2025</a:t>
+              <a:t>3/2/2025</a:t>
             </a:fld>
             <a:endParaRPr lang="en-US" sz="1200" kern="1200">
               <a:solidFill>
@@ -1276,7 +1275,7 @@
                 <a:cs typeface="+mn-cs"/>
               </a:rPr>
               <a:pPr algn="l" rtl="0"/>
-              <a:t>1/31/2025</a:t>
+              <a:t>3/2/2025</a:t>
             </a:fld>
             <a:endParaRPr lang="en-US" sz="1200" kern="1200">
               <a:solidFill>
@@ -1611,7 +1610,7 @@
                 <a:cs typeface="+mn-cs"/>
               </a:rPr>
               <a:pPr algn="l" rtl="0"/>
-              <a:t>1/31/2025</a:t>
+              <a:t>3/2/2025</a:t>
             </a:fld>
             <a:endParaRPr lang="en-US" sz="1200" kern="1200">
               <a:solidFill>
@@ -2080,7 +2079,7 @@
                 <a:cs typeface="+mn-cs"/>
               </a:rPr>
               <a:pPr algn="l" rtl="0"/>
-              <a:t>1/31/2025</a:t>
+              <a:t>3/2/2025</a:t>
             </a:fld>
             <a:endParaRPr lang="en-US" sz="1200" kern="1200">
               <a:solidFill>
@@ -2247,7 +2246,7 @@
                 <a:cs typeface="+mn-cs"/>
               </a:rPr>
               <a:pPr algn="l" rtl="0"/>
-              <a:t>1/31/2025</a:t>
+              <a:t>3/2/2025</a:t>
             </a:fld>
             <a:endParaRPr lang="en-US" sz="1200" kern="1200">
               <a:solidFill>
@@ -2392,7 +2391,7 @@
                 <a:cs typeface="+mn-cs"/>
               </a:rPr>
               <a:pPr algn="l" rtl="0"/>
-              <a:t>1/31/2025</a:t>
+              <a:t>3/2/2025</a:t>
             </a:fld>
             <a:endParaRPr lang="en-US" sz="1200" kern="1200">
               <a:solidFill>
@@ -2717,7 +2716,7 @@
                 <a:cs typeface="+mn-cs"/>
               </a:rPr>
               <a:pPr algn="l" rtl="0"/>
-              <a:t>1/31/2025</a:t>
+              <a:t>3/2/2025</a:t>
             </a:fld>
             <a:endParaRPr lang="en-US" sz="1200" kern="1200">
               <a:solidFill>
@@ -3019,7 +3018,7 @@
                 <a:cs typeface="+mn-cs"/>
               </a:rPr>
               <a:pPr algn="l" rtl="0"/>
-              <a:t>1/31/2025</a:t>
+              <a:t>3/2/2025</a:t>
             </a:fld>
             <a:endParaRPr lang="en-US" sz="1200" kern="1200">
               <a:solidFill>
@@ -3280,7 +3279,7 @@
                 <a:cs typeface="+mn-cs"/>
               </a:rPr>
               <a:pPr rtl="0"/>
-              <a:t>1/31/2025</a:t>
+              <a:t>3/2/2025</a:t>
             </a:fld>
             <a:endParaRPr lang="en-US" kern="1200">
               <a:solidFill>
@@ -3741,8 +3740,8 @@
                     </a:srgbClr>
                   </a:outerShdw>
                 </a:effectLst>
-                <a:latin typeface="Maiandra GD" pitchFamily="34" charset="0"/>
-                <a:ea typeface="FZCuYuan-M03S" pitchFamily="65" charset="-122"/>
+                <a:latin typeface="KaiTi" panose="02010609060101010101" pitchFamily="49" charset="-122"/>
+                <a:ea typeface="KaiTi" panose="02010609060101010101" pitchFamily="49" charset="-122"/>
               </a:rPr>
               <a:t>one_passage_cover</a:t>
             </a:r>
@@ -3761,8 +3760,8 @@
                   </a:srgbClr>
                 </a:outerShdw>
               </a:effectLst>
-              <a:latin typeface="Maiandra GD" pitchFamily="34" charset="0"/>
-              <a:ea typeface="FZCuYuan-M03S" pitchFamily="65" charset="-122"/>
+              <a:latin typeface="KaiTi" panose="02010609060101010101" pitchFamily="49" charset="-122"/>
+              <a:ea typeface="KaiTi" panose="02010609060101010101" pitchFamily="49" charset="-122"/>
             </a:endParaRPr>
           </a:p>
         </p:txBody>
@@ -4034,646 +4033,6 @@
 
 <file path=ppt/slides/slide2.xml><?xml version="1.0" encoding="utf-8"?>
 <p:sld xmlns:a="http://schemas.openxmlformats.org/drawingml/2006/main" xmlns:r="http://schemas.openxmlformats.org/officeDocument/2006/relationships" xmlns:p="http://schemas.openxmlformats.org/presentationml/2006/main">
-  <p:cSld>
-    <p:bg>
-      <p:bgPr>
-        <a:solidFill>
-          <a:srgbClr val="000000"/>
-        </a:solidFill>
-        <a:effectLst/>
-      </p:bgPr>
-    </p:bg>
-    <p:spTree>
-      <p:nvGrpSpPr>
-        <p:cNvPr id="1" name="">
-          <a:extLst>
-            <a:ext uri="{FF2B5EF4-FFF2-40B4-BE49-F238E27FC236}">
-              <a16:creationId xmlns:a16="http://schemas.microsoft.com/office/drawing/2014/main" id="{0A2D35BC-6C27-F822-6E55-C9C34925D5B0}"/>
-            </a:ext>
-          </a:extLst>
-        </p:cNvPr>
-        <p:cNvGrpSpPr/>
-        <p:nvPr/>
-      </p:nvGrpSpPr>
-      <p:grpSpPr>
-        <a:xfrm>
-          <a:off x="0" y="0"/>
-          <a:ext cx="0" cy="0"/>
-          <a:chOff x="0" y="0"/>
-          <a:chExt cx="0" cy="0"/>
-        </a:xfrm>
-      </p:grpSpPr>
-      <p:sp>
-        <p:nvSpPr>
-          <p:cNvPr id="2" name="overline">
-            <a:extLst>
-              <a:ext uri="{FF2B5EF4-FFF2-40B4-BE49-F238E27FC236}">
-                <a16:creationId xmlns:a16="http://schemas.microsoft.com/office/drawing/2014/main" id="{4EE55039-480F-4059-3A83-BBA9C32CC86E}"/>
-              </a:ext>
-            </a:extLst>
-          </p:cNvPr>
-          <p:cNvSpPr>
-            <a:spLocks noGrp="1"/>
-          </p:cNvSpPr>
-          <p:nvPr>
-            <p:ph type="ctrTitle"/>
-          </p:nvPr>
-        </p:nvSpPr>
-        <p:spPr>
-          <a:xfrm>
-            <a:off x="240145" y="129309"/>
-            <a:ext cx="10213573" cy="646331"/>
-          </a:xfrm>
-        </p:spPr>
-        <p:txBody>
-          <a:bodyPr wrap="square" anchor="t">
-            <a:spAutoFit/>
-          </a:bodyPr>
-          <a:lstStyle/>
-          <a:p>
-            <a:pPr algn="l"/>
-            <a:r>
-              <a:rPr lang="en-US" sz="3600" b="1" dirty="0" err="1">
-                <a:ln w="28575" cmpd="sng">
-                  <a:noFill/>
-                  <a:prstDash val="solid"/>
-                </a:ln>
-                <a:solidFill>
-                  <a:srgbClr val="FFFF00"/>
-                </a:solidFill>
-                <a:effectLst>
-                  <a:outerShdw blurRad="63500" dir="3600000" algn="tl" rotWithShape="0">
-                    <a:srgbClr val="000000">
-                      <a:alpha val="70000"/>
-                    </a:srgbClr>
-                  </a:outerShdw>
-                </a:effectLst>
-                <a:latin typeface="Maiandra GD" pitchFamily="34" charset="0"/>
-                <a:ea typeface="FZCuYuan-M03S" pitchFamily="65" charset="-122"/>
-              </a:rPr>
-              <a:t>two_passage_cover</a:t>
-            </a:r>
-            <a:endParaRPr lang="en-US" sz="3600" b="1" dirty="0">
-              <a:ln w="28575" cmpd="sng">
-                <a:noFill/>
-                <a:prstDash val="solid"/>
-              </a:ln>
-              <a:solidFill>
-                <a:srgbClr val="FFFF00"/>
-              </a:solidFill>
-              <a:effectLst>
-                <a:outerShdw blurRad="63500" dir="3600000" algn="tl" rotWithShape="0">
-                  <a:srgbClr val="000000">
-                    <a:alpha val="70000"/>
-                  </a:srgbClr>
-                </a:outerShdw>
-              </a:effectLst>
-              <a:latin typeface="Maiandra GD" pitchFamily="34" charset="0"/>
-              <a:ea typeface="FZCuYuan-M03S" pitchFamily="65" charset="-122"/>
-            </a:endParaRPr>
-          </a:p>
-        </p:txBody>
-      </p:sp>
-      <p:grpSp>
-        <p:nvGrpSpPr>
-          <p:cNvPr id="6" name="Group 5">
-            <a:extLst>
-              <a:ext uri="{FF2B5EF4-FFF2-40B4-BE49-F238E27FC236}">
-                <a16:creationId xmlns:a16="http://schemas.microsoft.com/office/drawing/2014/main" id="{137A156E-2A64-D74B-E8C2-2863431FDDC6}"/>
-              </a:ext>
-            </a:extLst>
-          </p:cNvPr>
-          <p:cNvGrpSpPr/>
-          <p:nvPr/>
-        </p:nvGrpSpPr>
-        <p:grpSpPr>
-          <a:xfrm>
-            <a:off x="1001865" y="1728660"/>
-            <a:ext cx="10188270" cy="2585323"/>
-            <a:chOff x="735051" y="1609907"/>
-            <a:chExt cx="10188270" cy="2585323"/>
-          </a:xfrm>
-        </p:grpSpPr>
-        <p:sp>
-          <p:nvSpPr>
-            <p:cNvPr id="3" name="title">
-              <a:extLst>
-                <a:ext uri="{FF2B5EF4-FFF2-40B4-BE49-F238E27FC236}">
-                  <a16:creationId xmlns:a16="http://schemas.microsoft.com/office/drawing/2014/main" id="{58E37EF3-E785-A33A-12F0-EE5F40928322}"/>
-                </a:ext>
-              </a:extLst>
-            </p:cNvPr>
-            <p:cNvSpPr txBox="1">
-              <a:spLocks/>
-            </p:cNvSpPr>
-            <p:nvPr/>
-          </p:nvSpPr>
-          <p:spPr>
-            <a:xfrm>
-              <a:off x="735051" y="1609907"/>
-              <a:ext cx="4451366" cy="2585323"/>
-            </a:xfrm>
-            <a:prstGeom prst="rect">
-              <a:avLst/>
-            </a:prstGeom>
-          </p:spPr>
-          <p:txBody>
-            <a:bodyPr vert="horz" wrap="square" lIns="91440" tIns="45720" rIns="91440" bIns="45720" rtlCol="0" anchor="t">
-              <a:spAutoFit/>
-            </a:bodyPr>
-            <a:lstStyle/>
-            <a:p>
-              <a:pPr marL="0" marR="0" lvl="0" indent="0" algn="ctr" defTabSz="914400" rtl="0" eaLnBrk="1" fontAlgn="auto" latinLnBrk="0" hangingPunct="1">
-                <a:lnSpc>
-                  <a:spcPct val="100000"/>
-                </a:lnSpc>
-                <a:spcBef>
-                  <a:spcPct val="0"/>
-                </a:spcBef>
-                <a:spcAft>
-                  <a:spcPts val="0"/>
-                </a:spcAft>
-                <a:buClrTx/>
-                <a:buSzTx/>
-                <a:buFontTx/>
-                <a:buNone/>
-                <a:tabLst/>
-                <a:defRPr/>
-              </a:pPr>
-              <a:r>
-                <a:rPr lang="en-MY" altLang="zh-CN" sz="5400" b="1" dirty="0">
-                  <a:ln w="28575" cmpd="sng">
-                    <a:noFill/>
-                    <a:prstDash val="solid"/>
-                  </a:ln>
-                  <a:solidFill>
-                    <a:srgbClr val="FFFFFF"/>
-                  </a:solidFill>
-                  <a:effectLst>
-                    <a:glow rad="63500">
-                      <a:prstClr val="black">
-                        <a:lumMod val="85000"/>
-                        <a:lumOff val="15000"/>
-                        <a:alpha val="40000"/>
-                      </a:prstClr>
-                    </a:glow>
-                    <a:outerShdw blurRad="63500" dir="3600000" algn="tl" rotWithShape="0">
-                      <a:srgbClr val="000000">
-                        <a:alpha val="70000"/>
-                      </a:srgbClr>
-                    </a:outerShdw>
-                  </a:effectLst>
-                  <a:latin typeface="KaiTi" panose="02010609060101010101" pitchFamily="49" charset="-122"/>
-                  <a:ea typeface="KaiTi" panose="02010609060101010101" pitchFamily="49" charset="-122"/>
-                </a:rPr>
-                <a:t>@chi_book1@</a:t>
-              </a:r>
-              <a:endParaRPr kumimoji="0" lang="en-MY" altLang="zh-CN" sz="5400" b="1" i="0" u="none" strike="noStrike" kern="1200" cap="none" spc="0" normalizeH="0" baseline="0" noProof="0" dirty="0">
-                <a:ln w="28575" cmpd="sng">
-                  <a:noFill/>
-                  <a:prstDash val="solid"/>
-                </a:ln>
-                <a:solidFill>
-                  <a:srgbClr val="FFFFFF"/>
-                </a:solidFill>
-                <a:effectLst>
-                  <a:glow rad="63500">
-                    <a:prstClr val="black">
-                      <a:lumMod val="85000"/>
-                      <a:lumOff val="15000"/>
-                      <a:alpha val="40000"/>
-                    </a:prstClr>
-                  </a:glow>
-                  <a:outerShdw blurRad="63500" dir="3600000" algn="tl" rotWithShape="0">
-                    <a:srgbClr val="000000">
-                      <a:alpha val="70000"/>
-                    </a:srgbClr>
-                  </a:outerShdw>
-                </a:effectLst>
-                <a:uLnTx/>
-                <a:uFillTx/>
-                <a:latin typeface="KaiTi" panose="02010609060101010101" pitchFamily="49" charset="-122"/>
-                <a:ea typeface="KaiTi" panose="02010609060101010101" pitchFamily="49" charset="-122"/>
-              </a:endParaRPr>
-            </a:p>
-            <a:p>
-              <a:pPr marL="0" marR="0" lvl="0" indent="0" algn="ctr" defTabSz="914400" rtl="0" eaLnBrk="1" fontAlgn="auto" latinLnBrk="0" hangingPunct="1">
-                <a:lnSpc>
-                  <a:spcPct val="100000"/>
-                </a:lnSpc>
-                <a:spcBef>
-                  <a:spcPct val="0"/>
-                </a:spcBef>
-                <a:spcAft>
-                  <a:spcPts val="0"/>
-                </a:spcAft>
-                <a:buClrTx/>
-                <a:buSzTx/>
-                <a:buFontTx/>
-                <a:buNone/>
-                <a:tabLst/>
-                <a:defRPr/>
-              </a:pPr>
-              <a:r>
-                <a:rPr lang="en-US" altLang="zh-CN" sz="5400" b="1" dirty="0">
-                  <a:ln w="28575" cmpd="sng">
-                    <a:noFill/>
-                    <a:prstDash val="solid"/>
-                  </a:ln>
-                  <a:solidFill>
-                    <a:srgbClr val="FFFFFF"/>
-                  </a:solidFill>
-                  <a:effectLst>
-                    <a:glow rad="63500">
-                      <a:prstClr val="black">
-                        <a:lumMod val="85000"/>
-                        <a:lumOff val="15000"/>
-                        <a:alpha val="40000"/>
-                      </a:prstClr>
-                    </a:glow>
-                    <a:outerShdw blurRad="63500" dir="3600000" algn="tl" rotWithShape="0">
-                      <a:srgbClr val="000000">
-                        <a:alpha val="70000"/>
-                      </a:srgbClr>
-                    </a:outerShdw>
-                  </a:effectLst>
-                  <a:latin typeface="KaiTi" panose="02010609060101010101" pitchFamily="49" charset="-122"/>
-                  <a:ea typeface="KaiTi" panose="02010609060101010101" pitchFamily="49" charset="-122"/>
-                </a:rPr>
-                <a:t>@eng_book1@</a:t>
-              </a:r>
-              <a:endParaRPr kumimoji="0" lang="en-MY" altLang="zh-CN" sz="5400" b="1" i="0" u="none" strike="noStrike" kern="1200" cap="none" spc="0" normalizeH="0" baseline="0" noProof="0" dirty="0">
-                <a:ln w="28575" cmpd="sng">
-                  <a:noFill/>
-                  <a:prstDash val="solid"/>
-                </a:ln>
-                <a:solidFill>
-                  <a:srgbClr val="FFFFFF"/>
-                </a:solidFill>
-                <a:effectLst>
-                  <a:glow rad="63500">
-                    <a:prstClr val="black">
-                      <a:lumMod val="85000"/>
-                      <a:lumOff val="15000"/>
-                      <a:alpha val="40000"/>
-                    </a:prstClr>
-                  </a:glow>
-                  <a:outerShdw blurRad="63500" dir="3600000" algn="tl" rotWithShape="0">
-                    <a:srgbClr val="000000">
-                      <a:alpha val="70000"/>
-                    </a:srgbClr>
-                  </a:outerShdw>
-                </a:effectLst>
-                <a:uLnTx/>
-                <a:uFillTx/>
-                <a:latin typeface="KaiTi" panose="02010609060101010101" pitchFamily="49" charset="-122"/>
-                <a:ea typeface="KaiTi" panose="02010609060101010101" pitchFamily="49" charset="-122"/>
-              </a:endParaRPr>
-            </a:p>
-            <a:p>
-              <a:pPr marL="0" marR="0" lvl="0" indent="0" algn="ctr" defTabSz="914400" rtl="0" eaLnBrk="1" fontAlgn="auto" latinLnBrk="0" hangingPunct="1">
-                <a:lnSpc>
-                  <a:spcPct val="100000"/>
-                </a:lnSpc>
-                <a:spcBef>
-                  <a:spcPct val="0"/>
-                </a:spcBef>
-                <a:spcAft>
-                  <a:spcPts val="0"/>
-                </a:spcAft>
-                <a:buClrTx/>
-                <a:buSzTx/>
-                <a:buFontTx/>
-                <a:buNone/>
-                <a:tabLst/>
-                <a:defRPr/>
-              </a:pPr>
-              <a:r>
-                <a:rPr lang="en-US" altLang="zh-CN" sz="5400" b="1" dirty="0">
-                  <a:ln w="28575" cmpd="sng">
-                    <a:noFill/>
-                    <a:prstDash val="solid"/>
-                  </a:ln>
-                  <a:solidFill>
-                    <a:srgbClr val="FFFFFF"/>
-                  </a:solidFill>
-                  <a:effectLst>
-                    <a:glow rad="63500">
-                      <a:prstClr val="black">
-                        <a:lumMod val="85000"/>
-                        <a:lumOff val="15000"/>
-                        <a:alpha val="40000"/>
-                      </a:prstClr>
-                    </a:glow>
-                    <a:outerShdw blurRad="63500" dir="3600000" algn="tl" rotWithShape="0">
-                      <a:srgbClr val="000000">
-                        <a:alpha val="70000"/>
-                      </a:srgbClr>
-                    </a:outerShdw>
-                  </a:effectLst>
-                  <a:latin typeface="KaiTi" panose="02010609060101010101" pitchFamily="49" charset="-122"/>
-                  <a:ea typeface="KaiTi" panose="02010609060101010101" pitchFamily="49" charset="-122"/>
-                </a:rPr>
-                <a:t>@verse1@</a:t>
-              </a:r>
-              <a:endParaRPr kumimoji="0" lang="en-US" altLang="zh-CN" sz="5400" b="1" i="0" u="none" strike="noStrike" kern="1200" cap="none" spc="0" normalizeH="0" baseline="0" noProof="0" dirty="0">
-                <a:ln w="28575" cmpd="sng">
-                  <a:noFill/>
-                  <a:prstDash val="solid"/>
-                </a:ln>
-                <a:solidFill>
-                  <a:srgbClr val="FFFFFF"/>
-                </a:solidFill>
-                <a:effectLst>
-                  <a:glow rad="63500">
-                    <a:prstClr val="black">
-                      <a:lumMod val="85000"/>
-                      <a:lumOff val="15000"/>
-                      <a:alpha val="40000"/>
-                    </a:prstClr>
-                  </a:glow>
-                  <a:outerShdw blurRad="63500" dir="3600000" algn="tl" rotWithShape="0">
-                    <a:srgbClr val="000000">
-                      <a:alpha val="70000"/>
-                    </a:srgbClr>
-                  </a:outerShdw>
-                </a:effectLst>
-                <a:uLnTx/>
-                <a:uFillTx/>
-                <a:latin typeface="KaiTi" panose="02010609060101010101" pitchFamily="49" charset="-122"/>
-                <a:ea typeface="KaiTi" panose="02010609060101010101" pitchFamily="49" charset="-122"/>
-              </a:endParaRPr>
-            </a:p>
-          </p:txBody>
-        </p:sp>
-        <p:sp>
-          <p:nvSpPr>
-            <p:cNvPr id="4" name="title">
-              <a:extLst>
-                <a:ext uri="{FF2B5EF4-FFF2-40B4-BE49-F238E27FC236}">
-                  <a16:creationId xmlns:a16="http://schemas.microsoft.com/office/drawing/2014/main" id="{52E111FD-BEF8-9793-40B1-A4E7D694380F}"/>
-                </a:ext>
-              </a:extLst>
-            </p:cNvPr>
-            <p:cNvSpPr txBox="1">
-              <a:spLocks/>
-            </p:cNvSpPr>
-            <p:nvPr/>
-          </p:nvSpPr>
-          <p:spPr>
-            <a:xfrm>
-              <a:off x="6471955" y="1609907"/>
-              <a:ext cx="4451366" cy="2585323"/>
-            </a:xfrm>
-            <a:prstGeom prst="rect">
-              <a:avLst/>
-            </a:prstGeom>
-          </p:spPr>
-          <p:txBody>
-            <a:bodyPr vert="horz" wrap="square" lIns="91440" tIns="45720" rIns="91440" bIns="45720" rtlCol="0" anchor="t">
-              <a:spAutoFit/>
-            </a:bodyPr>
-            <a:lstStyle/>
-            <a:p>
-              <a:pPr marL="0" marR="0" lvl="0" indent="0" algn="ctr" defTabSz="914400" rtl="0" eaLnBrk="1" fontAlgn="auto" latinLnBrk="0" hangingPunct="1">
-                <a:lnSpc>
-                  <a:spcPct val="100000"/>
-                </a:lnSpc>
-                <a:spcBef>
-                  <a:spcPct val="0"/>
-                </a:spcBef>
-                <a:spcAft>
-                  <a:spcPts val="0"/>
-                </a:spcAft>
-                <a:buClrTx/>
-                <a:buSzTx/>
-                <a:buFontTx/>
-                <a:buNone/>
-                <a:tabLst/>
-                <a:defRPr/>
-              </a:pPr>
-              <a:r>
-                <a:rPr lang="en-MY" altLang="zh-CN" sz="5400" b="1" dirty="0">
-                  <a:ln w="28575" cmpd="sng">
-                    <a:noFill/>
-                    <a:prstDash val="solid"/>
-                  </a:ln>
-                  <a:solidFill>
-                    <a:srgbClr val="FFFFFF"/>
-                  </a:solidFill>
-                  <a:effectLst>
-                    <a:glow rad="63500">
-                      <a:prstClr val="black">
-                        <a:lumMod val="85000"/>
-                        <a:lumOff val="15000"/>
-                        <a:alpha val="40000"/>
-                      </a:prstClr>
-                    </a:glow>
-                    <a:outerShdw blurRad="63500" dir="3600000" algn="tl" rotWithShape="0">
-                      <a:srgbClr val="000000">
-                        <a:alpha val="70000"/>
-                      </a:srgbClr>
-                    </a:outerShdw>
-                  </a:effectLst>
-                  <a:latin typeface="KaiTi" panose="02010609060101010101" pitchFamily="49" charset="-122"/>
-                  <a:ea typeface="KaiTi" panose="02010609060101010101" pitchFamily="49" charset="-122"/>
-                </a:rPr>
-                <a:t>@chi_book2@</a:t>
-              </a:r>
-              <a:endParaRPr kumimoji="0" lang="en-MY" altLang="zh-CN" sz="5400" b="1" i="0" u="none" strike="noStrike" kern="1200" cap="none" spc="0" normalizeH="0" baseline="0" noProof="0" dirty="0">
-                <a:ln w="28575" cmpd="sng">
-                  <a:noFill/>
-                  <a:prstDash val="solid"/>
-                </a:ln>
-                <a:solidFill>
-                  <a:srgbClr val="FFFFFF"/>
-                </a:solidFill>
-                <a:effectLst>
-                  <a:glow rad="63500">
-                    <a:prstClr val="black">
-                      <a:lumMod val="85000"/>
-                      <a:lumOff val="15000"/>
-                      <a:alpha val="40000"/>
-                    </a:prstClr>
-                  </a:glow>
-                  <a:outerShdw blurRad="63500" dir="3600000" algn="tl" rotWithShape="0">
-                    <a:srgbClr val="000000">
-                      <a:alpha val="70000"/>
-                    </a:srgbClr>
-                  </a:outerShdw>
-                </a:effectLst>
-                <a:uLnTx/>
-                <a:uFillTx/>
-                <a:latin typeface="KaiTi" panose="02010609060101010101" pitchFamily="49" charset="-122"/>
-                <a:ea typeface="KaiTi" panose="02010609060101010101" pitchFamily="49" charset="-122"/>
-              </a:endParaRPr>
-            </a:p>
-            <a:p>
-              <a:pPr marL="0" marR="0" lvl="0" indent="0" algn="ctr" defTabSz="914400" rtl="0" eaLnBrk="1" fontAlgn="auto" latinLnBrk="0" hangingPunct="1">
-                <a:lnSpc>
-                  <a:spcPct val="100000"/>
-                </a:lnSpc>
-                <a:spcBef>
-                  <a:spcPct val="0"/>
-                </a:spcBef>
-                <a:spcAft>
-                  <a:spcPts val="0"/>
-                </a:spcAft>
-                <a:buClrTx/>
-                <a:buSzTx/>
-                <a:buFontTx/>
-                <a:buNone/>
-                <a:tabLst/>
-                <a:defRPr/>
-              </a:pPr>
-              <a:r>
-                <a:rPr lang="en-US" altLang="zh-CN" sz="5400" b="1" dirty="0">
-                  <a:ln w="28575" cmpd="sng">
-                    <a:noFill/>
-                    <a:prstDash val="solid"/>
-                  </a:ln>
-                  <a:solidFill>
-                    <a:srgbClr val="FFFFFF"/>
-                  </a:solidFill>
-                  <a:effectLst>
-                    <a:glow rad="63500">
-                      <a:prstClr val="black">
-                        <a:lumMod val="85000"/>
-                        <a:lumOff val="15000"/>
-                        <a:alpha val="40000"/>
-                      </a:prstClr>
-                    </a:glow>
-                    <a:outerShdw blurRad="63500" dir="3600000" algn="tl" rotWithShape="0">
-                      <a:srgbClr val="000000">
-                        <a:alpha val="70000"/>
-                      </a:srgbClr>
-                    </a:outerShdw>
-                  </a:effectLst>
-                  <a:latin typeface="KaiTi" panose="02010609060101010101" pitchFamily="49" charset="-122"/>
-                  <a:ea typeface="KaiTi" panose="02010609060101010101" pitchFamily="49" charset="-122"/>
-                </a:rPr>
-                <a:t>@eng_book2@</a:t>
-              </a:r>
-              <a:endParaRPr kumimoji="0" lang="en-MY" altLang="zh-CN" sz="5400" b="1" i="0" u="none" strike="noStrike" kern="1200" cap="none" spc="0" normalizeH="0" baseline="0" noProof="0" dirty="0">
-                <a:ln w="28575" cmpd="sng">
-                  <a:noFill/>
-                  <a:prstDash val="solid"/>
-                </a:ln>
-                <a:solidFill>
-                  <a:srgbClr val="FFFFFF"/>
-                </a:solidFill>
-                <a:effectLst>
-                  <a:glow rad="63500">
-                    <a:prstClr val="black">
-                      <a:lumMod val="85000"/>
-                      <a:lumOff val="15000"/>
-                      <a:alpha val="40000"/>
-                    </a:prstClr>
-                  </a:glow>
-                  <a:outerShdw blurRad="63500" dir="3600000" algn="tl" rotWithShape="0">
-                    <a:srgbClr val="000000">
-                      <a:alpha val="70000"/>
-                    </a:srgbClr>
-                  </a:outerShdw>
-                </a:effectLst>
-                <a:uLnTx/>
-                <a:uFillTx/>
-                <a:latin typeface="KaiTi" panose="02010609060101010101" pitchFamily="49" charset="-122"/>
-                <a:ea typeface="KaiTi" panose="02010609060101010101" pitchFamily="49" charset="-122"/>
-              </a:endParaRPr>
-            </a:p>
-            <a:p>
-              <a:pPr marL="0" marR="0" lvl="0" indent="0" algn="ctr" defTabSz="914400" rtl="0" eaLnBrk="1" fontAlgn="auto" latinLnBrk="0" hangingPunct="1">
-                <a:lnSpc>
-                  <a:spcPct val="100000"/>
-                </a:lnSpc>
-                <a:spcBef>
-                  <a:spcPct val="0"/>
-                </a:spcBef>
-                <a:spcAft>
-                  <a:spcPts val="0"/>
-                </a:spcAft>
-                <a:buClrTx/>
-                <a:buSzTx/>
-                <a:buFontTx/>
-                <a:buNone/>
-                <a:tabLst/>
-                <a:defRPr/>
-              </a:pPr>
-              <a:r>
-                <a:rPr lang="en-US" altLang="zh-CN" sz="5400" b="1" dirty="0">
-                  <a:ln w="28575" cmpd="sng">
-                    <a:noFill/>
-                    <a:prstDash val="solid"/>
-                  </a:ln>
-                  <a:solidFill>
-                    <a:srgbClr val="FFFFFF"/>
-                  </a:solidFill>
-                  <a:effectLst>
-                    <a:glow rad="63500">
-                      <a:prstClr val="black">
-                        <a:lumMod val="85000"/>
-                        <a:lumOff val="15000"/>
-                        <a:alpha val="40000"/>
-                      </a:prstClr>
-                    </a:glow>
-                    <a:outerShdw blurRad="63500" dir="3600000" algn="tl" rotWithShape="0">
-                      <a:srgbClr val="000000">
-                        <a:alpha val="70000"/>
-                      </a:srgbClr>
-                    </a:outerShdw>
-                  </a:effectLst>
-                  <a:latin typeface="KaiTi" panose="02010609060101010101" pitchFamily="49" charset="-122"/>
-                  <a:ea typeface="KaiTi" panose="02010609060101010101" pitchFamily="49" charset="-122"/>
-                </a:rPr>
-                <a:t>@verse2@</a:t>
-              </a:r>
-              <a:endParaRPr kumimoji="0" lang="en-US" altLang="zh-CN" sz="5400" b="1" i="0" u="none" strike="noStrike" kern="1200" cap="none" spc="0" normalizeH="0" baseline="0" noProof="0" dirty="0">
-                <a:ln w="28575" cmpd="sng">
-                  <a:noFill/>
-                  <a:prstDash val="solid"/>
-                </a:ln>
-                <a:solidFill>
-                  <a:srgbClr val="FFFFFF"/>
-                </a:solidFill>
-                <a:effectLst>
-                  <a:glow rad="63500">
-                    <a:prstClr val="black">
-                      <a:lumMod val="85000"/>
-                      <a:lumOff val="15000"/>
-                      <a:alpha val="40000"/>
-                    </a:prstClr>
-                  </a:glow>
-                  <a:outerShdw blurRad="63500" dir="3600000" algn="tl" rotWithShape="0">
-                    <a:srgbClr val="000000">
-                      <a:alpha val="70000"/>
-                    </a:srgbClr>
-                  </a:outerShdw>
-                </a:effectLst>
-                <a:uLnTx/>
-                <a:uFillTx/>
-                <a:latin typeface="KaiTi" panose="02010609060101010101" pitchFamily="49" charset="-122"/>
-                <a:ea typeface="KaiTi" panose="02010609060101010101" pitchFamily="49" charset="-122"/>
-              </a:endParaRPr>
-            </a:p>
-          </p:txBody>
-        </p:sp>
-      </p:grpSp>
-    </p:spTree>
-    <p:extLst>
-      <p:ext uri="{BB962C8B-B14F-4D97-AF65-F5344CB8AC3E}">
-        <p14:creationId xmlns:p14="http://schemas.microsoft.com/office/powerpoint/2010/main" val="3936670738"/>
-      </p:ext>
-    </p:extLst>
-  </p:cSld>
-  <p:clrMapOvr>
-    <a:masterClrMapping/>
-  </p:clrMapOvr>
-</p:sld>
-</file>
-
-<file path=ppt/slides/slide3.xml><?xml version="1.0" encoding="utf-8"?>
-<p:sld xmlns:a="http://schemas.openxmlformats.org/drawingml/2006/main" xmlns:r="http://schemas.openxmlformats.org/officeDocument/2006/relationships" xmlns:p="http://schemas.openxmlformats.org/presentationml/2006/main">
   <p:cSld name="something">
     <p:bg>
       <p:bgPr>
@@ -4707,14 +4066,14 @@
             </a:extLst>
           </p:cNvPr>
           <p:cNvSpPr txBox="1">
-            <a:spLocks noGrp="1" noRot="1" noMove="1" noResize="1" noEditPoints="1" noAdjustHandles="1" noChangeArrowheads="1" noChangeShapeType="1"/>
+            <a:spLocks/>
           </p:cNvSpPr>
           <p:nvPr/>
         </p:nvSpPr>
         <p:spPr>
           <a:xfrm>
-            <a:off x="858416" y="1228404"/>
-            <a:ext cx="10590245" cy="2062089"/>
+            <a:off x="406400" y="1228404"/>
+            <a:ext cx="11457049" cy="2062089"/>
           </a:xfrm>
           <a:prstGeom prst="rect">
             <a:avLst/>
@@ -4778,7 +4137,7 @@
               </a:rPr>
               <a:t>@chi_verse@</a:t>
             </a:r>
-            <a:endParaRPr kumimoji="0" lang="en-US" altLang="zh-CN" sz="4400" b="1" i="0" u="none" strike="noStrike" kern="1200" cap="none" spc="0" normalizeH="0" baseline="0" noProof="0" dirty="0">
+            <a:endParaRPr kumimoji="0" lang="en-US" altLang="zh-CN" sz="4400" b="1" u="none" strike="noStrike" kern="1200" cap="none" spc="0" normalizeH="0" baseline="0" noProof="0" dirty="0">
               <a:ln>
                 <a:noFill/>
               </a:ln>
@@ -4817,7 +4176,7 @@
               <a:tabLst/>
               <a:defRPr/>
             </a:pPr>
-            <a:endParaRPr kumimoji="0" lang="en-MY" altLang="zh-CN" sz="2000" b="1" i="0" u="none" strike="noStrike" kern="1200" cap="none" spc="0" normalizeH="0" baseline="0" noProof="0" dirty="0">
+            <a:endParaRPr kumimoji="0" lang="en-MY" altLang="zh-CN" sz="2000" b="1" u="none" strike="noStrike" kern="1200" cap="none" spc="0" normalizeH="0" baseline="0" noProof="0" dirty="0">
               <a:ln>
                 <a:noFill/>
               </a:ln>
@@ -4836,8 +4195,8 @@
               </a:effectLst>
               <a:uLnTx/>
               <a:uFillTx/>
-              <a:latin typeface="Calibri"/>
-              <a:ea typeface="KaiTi" pitchFamily="49" charset="-122"/>
+              <a:latin typeface="KaiTi" panose="02010609060101010101" pitchFamily="49" charset="-122"/>
+              <a:ea typeface="KaiTi" panose="02010609060101010101" pitchFamily="49" charset="-122"/>
               <a:cs typeface="Arial" pitchFamily="34" charset="0"/>
             </a:endParaRPr>
           </a:p>
@@ -4929,11 +4288,12 @@
           <a:p>
             <a:pPr algn="l"/>
             <a:r>
-              <a:rPr lang="en-US" sz="3200" b="1">
+              <a:rPr lang="en-US" sz="3200" b="1" dirty="0">
                 <a:solidFill>
                   <a:srgbClr val="FFFFFF"/>
                 </a:solidFill>
-                <a:ea typeface="经典圆体简" pitchFamily="49" charset="-122"/>
+                <a:latin typeface="KaiTi" panose="02010609060101010101" pitchFamily="49" charset="-122"/>
+                <a:ea typeface="KaiTi" panose="02010609060101010101" pitchFamily="49" charset="-122"/>
               </a:rPr>
               <a:t>verse</a:t>
             </a:r>
@@ -4941,7 +4301,8 @@
               <a:solidFill>
                 <a:srgbClr val="FFFFFF"/>
               </a:solidFill>
-              <a:ea typeface="经典圆体简"/>
+              <a:latin typeface="KaiTi" panose="02010609060101010101" pitchFamily="49" charset="-122"/>
+              <a:ea typeface="KaiTi" panose="02010609060101010101" pitchFamily="49" charset="-122"/>
             </a:endParaRPr>
           </a:p>
         </p:txBody>

</xml_diff>